<commit_message>
added final generation of mkt stochastic scenrario
</commit_message>
<xml_diff>
--- a/Course summary.pptx
+++ b/Course summary.pptx
@@ -5,7 +5,7 @@
     <p:sldMasterId id="2147483672" r:id="rId1"/>
   </p:sldMasterIdLst>
   <p:notesMasterIdLst>
-    <p:notesMasterId r:id="rId8"/>
+    <p:notesMasterId r:id="rId11"/>
   </p:notesMasterIdLst>
   <p:sldIdLst>
     <p:sldId id="256" r:id="rId2"/>
@@ -13,7 +13,10 @@
     <p:sldId id="258" r:id="rId4"/>
     <p:sldId id="259" r:id="rId5"/>
     <p:sldId id="261" r:id="rId6"/>
-    <p:sldId id="260" r:id="rId7"/>
+    <p:sldId id="263" r:id="rId7"/>
+    <p:sldId id="262" r:id="rId8"/>
+    <p:sldId id="260" r:id="rId9"/>
+    <p:sldId id="264" r:id="rId10"/>
   </p:sldIdLst>
   <p:sldSz cx="6858000" cy="9906000" type="A4"/>
   <p:notesSz cx="9144000" cy="6858000"/>
@@ -112,6 +115,11 @@
       </a:defRPr>
     </a:lvl9pPr>
   </p:defaultTextStyle>
+  <p:extLst>
+    <p:ext uri="{EFAFB233-063F-42B5-8137-9DF3F51BA10A}">
+      <p15:sldGuideLst xmlns:p15="http://schemas.microsoft.com/office/powerpoint/2012/main"/>
+    </p:ext>
+  </p:extLst>
 </p:presentation>
 </file>
 
@@ -197,7 +205,7 @@
           <a:p>
             <a:fld id="{FCE60A40-D887-2240-ABD0-250C9328788D}" type="datetimeFigureOut">
               <a:rPr lang="en-FR" smtClean="0"/>
-              <a:t>18/01/2025</a:t>
+              <a:t>21/01/2025</a:t>
             </a:fld>
             <a:endParaRPr lang="en-FR"/>
           </a:p>
@@ -680,7 +688,7 @@
           <a:p>
             <a:fld id="{6F3BB796-48B8-8045-B2BB-019780C7052A}" type="datetimeFigureOut">
               <a:rPr lang="en-FR" smtClean="0"/>
-              <a:t>15/01/2025</a:t>
+              <a:t>21/01/2025</a:t>
             </a:fld>
             <a:endParaRPr lang="en-FR"/>
           </a:p>
@@ -850,7 +858,7 @@
           <a:p>
             <a:fld id="{6F3BB796-48B8-8045-B2BB-019780C7052A}" type="datetimeFigureOut">
               <a:rPr lang="en-FR" smtClean="0"/>
-              <a:t>15/01/2025</a:t>
+              <a:t>21/01/2025</a:t>
             </a:fld>
             <a:endParaRPr lang="en-FR"/>
           </a:p>
@@ -1030,7 +1038,7 @@
           <a:p>
             <a:fld id="{6F3BB796-48B8-8045-B2BB-019780C7052A}" type="datetimeFigureOut">
               <a:rPr lang="en-FR" smtClean="0"/>
-              <a:t>15/01/2025</a:t>
+              <a:t>21/01/2025</a:t>
             </a:fld>
             <a:endParaRPr lang="en-FR"/>
           </a:p>
@@ -1200,7 +1208,7 @@
           <a:p>
             <a:fld id="{6F3BB796-48B8-8045-B2BB-019780C7052A}" type="datetimeFigureOut">
               <a:rPr lang="en-FR" smtClean="0"/>
-              <a:t>15/01/2025</a:t>
+              <a:t>21/01/2025</a:t>
             </a:fld>
             <a:endParaRPr lang="en-FR"/>
           </a:p>
@@ -1444,7 +1452,7 @@
           <a:p>
             <a:fld id="{6F3BB796-48B8-8045-B2BB-019780C7052A}" type="datetimeFigureOut">
               <a:rPr lang="en-FR" smtClean="0"/>
-              <a:t>15/01/2025</a:t>
+              <a:t>21/01/2025</a:t>
             </a:fld>
             <a:endParaRPr lang="en-FR"/>
           </a:p>
@@ -1676,7 +1684,7 @@
           <a:p>
             <a:fld id="{6F3BB796-48B8-8045-B2BB-019780C7052A}" type="datetimeFigureOut">
               <a:rPr lang="en-FR" smtClean="0"/>
-              <a:t>15/01/2025</a:t>
+              <a:t>21/01/2025</a:t>
             </a:fld>
             <a:endParaRPr lang="en-FR"/>
           </a:p>
@@ -2043,7 +2051,7 @@
           <a:p>
             <a:fld id="{6F3BB796-48B8-8045-B2BB-019780C7052A}" type="datetimeFigureOut">
               <a:rPr lang="en-FR" smtClean="0"/>
-              <a:t>15/01/2025</a:t>
+              <a:t>21/01/2025</a:t>
             </a:fld>
             <a:endParaRPr lang="en-FR"/>
           </a:p>
@@ -2161,7 +2169,7 @@
           <a:p>
             <a:fld id="{6F3BB796-48B8-8045-B2BB-019780C7052A}" type="datetimeFigureOut">
               <a:rPr lang="en-FR" smtClean="0"/>
-              <a:t>15/01/2025</a:t>
+              <a:t>21/01/2025</a:t>
             </a:fld>
             <a:endParaRPr lang="en-FR"/>
           </a:p>
@@ -2256,7 +2264,7 @@
           <a:p>
             <a:fld id="{6F3BB796-48B8-8045-B2BB-019780C7052A}" type="datetimeFigureOut">
               <a:rPr lang="en-FR" smtClean="0"/>
-              <a:t>15/01/2025</a:t>
+              <a:t>21/01/2025</a:t>
             </a:fld>
             <a:endParaRPr lang="en-FR"/>
           </a:p>
@@ -2533,7 +2541,7 @@
           <a:p>
             <a:fld id="{6F3BB796-48B8-8045-B2BB-019780C7052A}" type="datetimeFigureOut">
               <a:rPr lang="en-FR" smtClean="0"/>
-              <a:t>15/01/2025</a:t>
+              <a:t>21/01/2025</a:t>
             </a:fld>
             <a:endParaRPr lang="en-FR"/>
           </a:p>
@@ -2790,7 +2798,7 @@
           <a:p>
             <a:fld id="{6F3BB796-48B8-8045-B2BB-019780C7052A}" type="datetimeFigureOut">
               <a:rPr lang="en-FR" smtClean="0"/>
-              <a:t>15/01/2025</a:t>
+              <a:t>21/01/2025</a:t>
             </a:fld>
             <a:endParaRPr lang="en-FR"/>
           </a:p>
@@ -3003,7 +3011,7 @@
           <a:p>
             <a:fld id="{6F3BB796-48B8-8045-B2BB-019780C7052A}" type="datetimeFigureOut">
               <a:rPr lang="en-FR" smtClean="0"/>
-              <a:t>15/01/2025</a:t>
+              <a:t>21/01/2025</a:t>
             </a:fld>
             <a:endParaRPr lang="en-FR"/>
           </a:p>
@@ -4471,8 +4479,8 @@
           </a:p>
         </p:txBody>
       </p:sp>
-      <mc:AlternateContent xmlns:mc="http://schemas.openxmlformats.org/markup-compatibility/2006">
-        <mc:Choice xmlns:a14="http://schemas.microsoft.com/office/drawing/2010/main" Requires="a14">
+      <mc:AlternateContent xmlns:mc="http://schemas.openxmlformats.org/markup-compatibility/2006" xmlns:a14="http://schemas.microsoft.com/office/drawing/2010/main">
+        <mc:Choice Requires="a14">
           <p:sp>
             <p:nvSpPr>
               <p:cNvPr id="35" name="TextBox 34">
@@ -4520,6 +4528,7 @@
                             <a:solidFill>
                               <a:srgbClr val="002060"/>
                             </a:solidFill>
+                            <a:latin typeface="Cambria Math" panose="02040503050406030204" pitchFamily="18" charset="0"/>
                           </a:rPr>
                         </m:ctrlPr>
                       </m:fPr>
@@ -4531,6 +4540,7 @@
                                 <a:solidFill>
                                   <a:srgbClr val="002060"/>
                                 </a:solidFill>
+                                <a:latin typeface="Cambria Math" panose="02040503050406030204" pitchFamily="18" charset="0"/>
                               </a:rPr>
                             </m:ctrlPr>
                           </m:sSubPr>
@@ -4540,6 +4550,7 @@
                                 <a:solidFill>
                                   <a:srgbClr val="002060"/>
                                 </a:solidFill>
+                                <a:latin typeface="Cambria Math" panose="02040503050406030204" pitchFamily="18" charset="0"/>
                               </a:rPr>
                               <m:t>𝑨</m:t>
                             </m:r>
@@ -4550,6 +4561,7 @@
                                 <a:solidFill>
                                   <a:srgbClr val="002060"/>
                                 </a:solidFill>
+                                <a:latin typeface="Cambria Math" panose="02040503050406030204" pitchFamily="18" charset="0"/>
                               </a:rPr>
                               <m:t>𝒕</m:t>
                             </m:r>
@@ -4564,6 +4576,7 @@
                                 <a:solidFill>
                                   <a:srgbClr val="002060"/>
                                 </a:solidFill>
+                                <a:latin typeface="Cambria Math" panose="02040503050406030204" pitchFamily="18" charset="0"/>
                               </a:rPr>
                             </m:ctrlPr>
                           </m:sSubPr>
@@ -4573,6 +4586,7 @@
                                 <a:solidFill>
                                   <a:srgbClr val="002060"/>
                                 </a:solidFill>
+                                <a:latin typeface="Cambria Math" panose="02040503050406030204" pitchFamily="18" charset="0"/>
                               </a:rPr>
                               <m:t>𝑳</m:t>
                             </m:r>
@@ -4583,6 +4597,7 @@
                                 <a:solidFill>
                                   <a:srgbClr val="002060"/>
                                 </a:solidFill>
+                                <a:latin typeface="Cambria Math" panose="02040503050406030204" pitchFamily="18" charset="0"/>
                               </a:rPr>
                               <m:t>𝒕</m:t>
                             </m:r>
@@ -4603,18 +4618,24 @@
                     <m:sSub>
                       <m:sSubPr>
                         <m:ctrlPr>
-                          <a:rPr lang="en-US" sz="1000" i="1"/>
+                          <a:rPr lang="en-US" sz="1000" i="1">
+                            <a:latin typeface="Cambria Math" panose="02040503050406030204" pitchFamily="18" charset="0"/>
+                          </a:rPr>
                         </m:ctrlPr>
                       </m:sSubPr>
                       <m:e>
                         <m:r>
-                          <a:rPr lang="en-US" sz="1000" i="1"/>
+                          <a:rPr lang="en-US" sz="1000" i="1">
+                            <a:latin typeface="Cambria Math" panose="02040503050406030204" pitchFamily="18" charset="0"/>
+                          </a:rPr>
                           <m:t>𝐴</m:t>
                         </m:r>
                       </m:e>
                       <m:sub>
                         <m:r>
-                          <a:rPr lang="en-US" sz="1000" i="1"/>
+                          <a:rPr lang="en-US" sz="1000" i="1">
+                            <a:latin typeface="Cambria Math" panose="02040503050406030204" pitchFamily="18" charset="0"/>
+                          </a:rPr>
                           <m:t>𝑡</m:t>
                         </m:r>
                       </m:sub>
@@ -4632,18 +4653,24 @@
                     <m:sSub>
                       <m:sSubPr>
                         <m:ctrlPr>
-                          <a:rPr lang="en-US" sz="1000" i="1"/>
+                          <a:rPr lang="en-US" sz="1000" i="1">
+                            <a:latin typeface="Cambria Math" panose="02040503050406030204" pitchFamily="18" charset="0"/>
+                          </a:rPr>
                         </m:ctrlPr>
                       </m:sSubPr>
                       <m:e>
                         <m:r>
-                          <a:rPr lang="en-US" sz="1000" i="1"/>
+                          <a:rPr lang="en-US" sz="1000" i="1">
+                            <a:latin typeface="Cambria Math" panose="02040503050406030204" pitchFamily="18" charset="0"/>
+                          </a:rPr>
                           <m:t>𝐿</m:t>
                         </m:r>
                       </m:e>
                       <m:sub>
                         <m:r>
-                          <a:rPr lang="en-US" sz="1000" i="1"/>
+                          <a:rPr lang="en-US" sz="1000" i="1">
+                            <a:latin typeface="Cambria Math" panose="02040503050406030204" pitchFamily="18" charset="0"/>
+                          </a:rPr>
                           <m:t>𝑡</m:t>
                         </m:r>
                       </m:sub>
@@ -4723,7 +4750,7 @@
             </p:txBody>
           </p:sp>
         </mc:Choice>
-        <mc:Fallback>
+        <mc:Fallback xmlns="">
           <p:sp>
             <p:nvSpPr>
               <p:cNvPr id="35" name="TextBox 34">
@@ -6897,8 +6924,8 @@
           </a:p>
         </p:txBody>
       </p:sp>
-      <mc:AlternateContent xmlns:mc="http://schemas.openxmlformats.org/markup-compatibility/2006">
-        <mc:Choice xmlns:a14="http://schemas.microsoft.com/office/drawing/2010/main" Requires="a14">
+      <mc:AlternateContent xmlns:mc="http://schemas.openxmlformats.org/markup-compatibility/2006" xmlns:a14="http://schemas.microsoft.com/office/drawing/2010/main">
+        <mc:Choice Requires="a14">
           <p:sp>
             <p:nvSpPr>
               <p:cNvPr id="62" name="TextBox 61">
@@ -6927,6 +6954,7 @@
               </a:bodyPr>
               <a:lstStyle/>
               <a:p>
+                <a:pPr/>
                 <a14:m>
                   <m:oMathPara xmlns:m="http://schemas.openxmlformats.org/officeDocument/2006/math">
                     <m:oMathParaPr>
@@ -6947,7 +6975,7 @@
             </p:txBody>
           </p:sp>
         </mc:Choice>
-        <mc:Fallback>
+        <mc:Fallback xmlns="">
           <p:sp>
             <p:nvSpPr>
               <p:cNvPr id="62" name="TextBox 61">
@@ -7096,8 +7124,8 @@
           </a:p>
         </p:txBody>
       </p:sp>
-      <mc:AlternateContent xmlns:mc="http://schemas.openxmlformats.org/markup-compatibility/2006">
-        <mc:Choice xmlns:a14="http://schemas.microsoft.com/office/drawing/2010/main" Requires="a14">
+      <mc:AlternateContent xmlns:mc="http://schemas.openxmlformats.org/markup-compatibility/2006" xmlns:a14="http://schemas.microsoft.com/office/drawing/2010/main">
+        <mc:Choice Requires="a14">
           <p:sp>
             <p:nvSpPr>
               <p:cNvPr id="1025" name="TextBox 1024">
@@ -7126,6 +7154,7 @@
               </a:bodyPr>
               <a:lstStyle/>
               <a:p>
+                <a:pPr/>
                 <a14:m>
                   <m:oMathPara xmlns:m="http://schemas.openxmlformats.org/officeDocument/2006/math">
                     <m:oMathParaPr>
@@ -7239,7 +7268,7 @@
             </p:txBody>
           </p:sp>
         </mc:Choice>
-        <mc:Fallback>
+        <mc:Fallback xmlns="">
           <p:sp>
             <p:nvSpPr>
               <p:cNvPr id="1025" name="TextBox 1024">
@@ -7428,7 +7457,7 @@
         </p:blipFill>
         <p:spPr>
           <a:xfrm>
-            <a:off x="1079976" y="7345747"/>
+            <a:off x="1079976" y="6982187"/>
             <a:ext cx="1199400" cy="359468"/>
           </a:xfrm>
           <a:prstGeom prst="rect">
@@ -7492,8 +7521,8 @@
         </p:nvCxnSpPr>
         <p:spPr>
           <a:xfrm>
-            <a:off x="3428999" y="797959"/>
-            <a:ext cx="0" cy="7501211"/>
+            <a:off x="3428999" y="369332"/>
+            <a:ext cx="0" cy="9164412"/>
           </a:xfrm>
           <a:prstGeom prst="line">
             <a:avLst/>
@@ -7533,7 +7562,7 @@
         </p:nvSpPr>
         <p:spPr>
           <a:xfrm>
-            <a:off x="0" y="237231"/>
+            <a:off x="-35747" y="165424"/>
             <a:ext cx="3446873" cy="1384995"/>
           </a:xfrm>
           <a:prstGeom prst="rect">
@@ -7612,7 +7641,7 @@
         </p:nvSpPr>
         <p:spPr>
           <a:xfrm>
-            <a:off x="0" y="1580014"/>
+            <a:off x="-35747" y="1433016"/>
             <a:ext cx="3446873" cy="923330"/>
           </a:xfrm>
           <a:prstGeom prst="rect">
@@ -7690,8 +7719,8 @@
         </p:nvSpPr>
         <p:spPr>
           <a:xfrm>
-            <a:off x="0" y="2439382"/>
-            <a:ext cx="3446873" cy="1600438"/>
+            <a:off x="0" y="2271253"/>
+            <a:ext cx="3446873" cy="1523494"/>
           </a:xfrm>
           <a:prstGeom prst="rect">
             <a:avLst/>
@@ -7791,7 +7820,14 @@
             </a:r>
           </a:p>
           <a:p>
-            <a:endParaRPr lang="en-GB" sz="1000" dirty="0"/>
+            <a:pPr marL="285750" indent="-285750">
+              <a:buFont typeface="Arial" panose="020B0604020202020204" pitchFamily="34" charset="0"/>
+              <a:buChar char="•"/>
+            </a:pPr>
+            <a:r>
+              <a:rPr lang="en-GB" sz="500" dirty="0"/>
+              <a:t> </a:t>
+            </a:r>
           </a:p>
           <a:p>
             <a:r>
@@ -7836,7 +7872,7 @@
         </p:blipFill>
         <p:spPr>
           <a:xfrm>
-            <a:off x="722246" y="3997968"/>
+            <a:off x="722246" y="3766984"/>
             <a:ext cx="1557130" cy="367129"/>
           </a:xfrm>
           <a:prstGeom prst="rect">
@@ -7860,7 +7896,7 @@
         </p:nvCxnSpPr>
         <p:spPr>
           <a:xfrm flipH="1" flipV="1">
-            <a:off x="2279376" y="4273314"/>
+            <a:off x="2279376" y="4042330"/>
             <a:ext cx="251789" cy="91783"/>
           </a:xfrm>
           <a:prstGeom prst="straightConnector1">
@@ -7901,7 +7937,7 @@
         </p:nvCxnSpPr>
         <p:spPr>
           <a:xfrm flipV="1">
-            <a:off x="1457740" y="4365097"/>
+            <a:off x="1457740" y="4134113"/>
             <a:ext cx="86141" cy="186714"/>
           </a:xfrm>
           <a:prstGeom prst="straightConnector1">
@@ -7942,7 +7978,7 @@
         </p:nvCxnSpPr>
         <p:spPr>
           <a:xfrm flipV="1">
-            <a:off x="1896717" y="4319205"/>
+            <a:off x="1896717" y="4088221"/>
             <a:ext cx="86141" cy="186714"/>
           </a:xfrm>
           <a:prstGeom prst="straightConnector1">
@@ -7981,8 +8017,8 @@
         </p:nvSpPr>
         <p:spPr>
           <a:xfrm>
-            <a:off x="-1" y="4563040"/>
-            <a:ext cx="3446873" cy="1938992"/>
+            <a:off x="-1" y="4332056"/>
+            <a:ext cx="3446873" cy="1862048"/>
           </a:xfrm>
           <a:prstGeom prst="rect">
             <a:avLst/>
@@ -8097,9 +8133,12 @@
           </a:p>
           <a:p>
             <a:pPr algn="just"/>
-            <a:endParaRPr lang="en-GB" sz="1000" dirty="0">
-              <a:latin typeface="Cmr10"/>
-            </a:endParaRPr>
+            <a:r>
+              <a:rPr lang="en-GB" sz="500" dirty="0">
+                <a:latin typeface="Cmr10"/>
+              </a:rPr>
+              <a:t> </a:t>
+            </a:r>
           </a:p>
           <a:p>
             <a:pPr algn="just"/>
@@ -8134,8 +8173,8 @@
         </p:nvSpPr>
         <p:spPr>
           <a:xfrm>
-            <a:off x="0" y="6500829"/>
-            <a:ext cx="3446873" cy="3539430"/>
+            <a:off x="0" y="6109823"/>
+            <a:ext cx="3446873" cy="4154984"/>
           </a:xfrm>
           <a:prstGeom prst="rect">
             <a:avLst/>
@@ -8185,17 +8224,31 @@
             </a:endParaRPr>
           </a:p>
           <a:p>
-            <a:pPr algn="just"/>
+            <a:pPr marL="171450" indent="-171450" algn="just">
+              <a:buFont typeface="Arial" panose="020B0604020202020204" pitchFamily="34" charset="0"/>
+              <a:buChar char="•"/>
+            </a:pPr>
             <a:r>
               <a:rPr lang="en-GB" sz="1000" dirty="0">
                 <a:effectLst/>
                 <a:latin typeface="Dcr10"/>
               </a:rPr>
-              <a:t>But using GMV as a proxy for the MSR assumes identical expected returns, which is not a reasonable prior.</a:t>
-            </a:r>
-          </a:p>
-          <a:p>
-            <a:pPr algn="just"/>
+              <a:t>But using GMV as a proxy for the MSR assumes identical expected returns, which is not a reasonable prior. It is </a:t>
+            </a:r>
+            <a:r>
+              <a:rPr lang="en-US" sz="1000" dirty="0"/>
+              <a:t>unrealistic assumption, because expected returns are different because they have different exposure to systematic risks (not because of historical data!). Hence, all mu are not equal, hence, GMV is not the best portfolio</a:t>
+            </a:r>
+            <a:endParaRPr lang="en-GB" sz="1000" dirty="0">
+              <a:effectLst/>
+              <a:latin typeface="Dcr10"/>
+            </a:endParaRPr>
+          </a:p>
+          <a:p>
+            <a:pPr marL="171450" indent="-171450" algn="just">
+              <a:buFont typeface="Arial" panose="020B0604020202020204" pitchFamily="34" charset="0"/>
+              <a:buChar char="•"/>
+            </a:pPr>
             <a:r>
               <a:rPr lang="en-GB" sz="1000" dirty="0">
                 <a:latin typeface="Dcr10"/>
@@ -8234,7 +8287,10 @@
             </a:r>
           </a:p>
           <a:p>
-            <a:pPr algn="just"/>
+            <a:pPr marL="171450" indent="-171450" algn="just">
+              <a:buFont typeface="Arial" panose="020B0604020202020204" pitchFamily="34" charset="0"/>
+              <a:buChar char="•"/>
+            </a:pPr>
             <a:r>
               <a:rPr lang="en-GB" sz="1000" dirty="0">
                 <a:effectLst/>
@@ -8261,8 +8317,8 @@
           </a:p>
         </p:txBody>
       </p:sp>
-      <mc:AlternateContent xmlns:mc="http://schemas.openxmlformats.org/markup-compatibility/2006">
-        <mc:Choice xmlns:a14="http://schemas.microsoft.com/office/drawing/2010/main" Requires="a14">
+      <mc:AlternateContent xmlns:mc="http://schemas.openxmlformats.org/markup-compatibility/2006" xmlns:a14="http://schemas.microsoft.com/office/drawing/2010/main">
+        <mc:Choice Requires="a14">
           <p:sp>
             <p:nvSpPr>
               <p:cNvPr id="23" name="TextBox 22">
@@ -8986,7 +9042,7 @@
             </p:txBody>
           </p:sp>
         </mc:Choice>
-        <mc:Fallback>
+        <mc:Fallback xmlns="">
           <p:sp>
             <p:nvSpPr>
               <p:cNvPr id="23" name="TextBox 22">
@@ -9320,46 +9376,6 @@
           <a:chExt cx="0" cy="0"/>
         </a:xfrm>
       </p:grpSpPr>
-      <p:sp>
-        <p:nvSpPr>
-          <p:cNvPr id="2" name="TextBox 1">
-            <a:extLst>
-              <a:ext uri="{FF2B5EF4-FFF2-40B4-BE49-F238E27FC236}">
-                <a16:creationId xmlns:a16="http://schemas.microsoft.com/office/drawing/2014/main" id="{240FE23E-B567-F8DB-D53E-254770FBB5F0}"/>
-              </a:ext>
-            </a:extLst>
-          </p:cNvPr>
-          <p:cNvSpPr txBox="1"/>
-          <p:nvPr/>
-        </p:nvSpPr>
-        <p:spPr>
-          <a:xfrm>
-            <a:off x="1236057" y="0"/>
-            <a:ext cx="4385885" cy="369332"/>
-          </a:xfrm>
-          <a:prstGeom prst="rect">
-            <a:avLst/>
-          </a:prstGeom>
-          <a:noFill/>
-        </p:spPr>
-        <p:txBody>
-          <a:bodyPr wrap="square" rtlCol="0">
-            <a:spAutoFit/>
-          </a:bodyPr>
-          <a:lstStyle/>
-          <a:p>
-            <a:pPr algn="ctr"/>
-            <a:r>
-              <a:rPr lang="en-FR" b="1" dirty="0">
-                <a:solidFill>
-                  <a:srgbClr val="002060"/>
-                </a:solidFill>
-              </a:rPr>
-              <a:t>The Sword</a:t>
-            </a:r>
-          </a:p>
-        </p:txBody>
-      </p:sp>
       <p:cxnSp>
         <p:nvCxnSpPr>
           <p:cNvPr id="3" name="Straight Connector 2">
@@ -9376,8 +9392,8 @@
         </p:nvCxnSpPr>
         <p:spPr>
           <a:xfrm>
-            <a:off x="3428999" y="369332"/>
-            <a:ext cx="0" cy="9389663"/>
+            <a:off x="3428999" y="0"/>
+            <a:ext cx="0" cy="9758995"/>
           </a:xfrm>
           <a:prstGeom prst="line">
             <a:avLst/>
@@ -9417,7 +9433,7 @@
         </p:nvSpPr>
         <p:spPr>
           <a:xfrm>
-            <a:off x="0" y="237231"/>
+            <a:off x="-17874" y="0"/>
             <a:ext cx="3446873" cy="1538883"/>
           </a:xfrm>
           <a:prstGeom prst="rect">
@@ -9504,7 +9520,7 @@
         </p:blipFill>
         <p:spPr>
           <a:xfrm>
-            <a:off x="536628" y="1691006"/>
+            <a:off x="573429" y="1327875"/>
             <a:ext cx="1816821" cy="644678"/>
           </a:xfrm>
           <a:prstGeom prst="rect">
@@ -9526,7 +9542,7 @@
         </p:nvSpPr>
         <p:spPr>
           <a:xfrm>
-            <a:off x="2067130" y="1607663"/>
+            <a:off x="2049256" y="1370432"/>
             <a:ext cx="930895" cy="215444"/>
           </a:xfrm>
           <a:prstGeom prst="rect">
@@ -9565,7 +9581,7 @@
         </p:nvSpPr>
         <p:spPr>
           <a:xfrm>
-            <a:off x="7488" y="2335684"/>
+            <a:off x="-10386" y="2098453"/>
             <a:ext cx="3421511" cy="3693319"/>
           </a:xfrm>
           <a:prstGeom prst="rect">
@@ -9663,7 +9679,7 @@
         </p:blipFill>
         <p:spPr>
           <a:xfrm>
-            <a:off x="91824" y="5632781"/>
+            <a:off x="73950" y="5395550"/>
             <a:ext cx="1340468" cy="509261"/>
           </a:xfrm>
           <a:prstGeom prst="rect">
@@ -9693,7 +9709,7 @@
         </p:blipFill>
         <p:spPr>
           <a:xfrm>
-            <a:off x="91824" y="6737580"/>
+            <a:off x="73950" y="6500349"/>
             <a:ext cx="1411222" cy="355613"/>
           </a:xfrm>
           <a:prstGeom prst="rect">
@@ -9715,8 +9731,8 @@
         </p:nvSpPr>
         <p:spPr>
           <a:xfrm>
-            <a:off x="7935" y="6090904"/>
-            <a:ext cx="3438938" cy="1508105"/>
+            <a:off x="-9940" y="5853673"/>
+            <a:ext cx="3524919" cy="1815882"/>
           </a:xfrm>
           <a:prstGeom prst="rect">
             <a:avLst/>
@@ -9770,6 +9786,603 @@
               </a:rPr>
               <a:t>When the number of assets is large, curse of dimensionality appears and imposes difficulty on covariance matrix estimation.</a:t>
             </a:r>
+          </a:p>
+          <a:p>
+            <a:endParaRPr lang="en-GB" sz="1000" dirty="0">
+              <a:latin typeface="Dcr10"/>
+            </a:endParaRPr>
+          </a:p>
+          <a:p>
+            <a:r>
+              <a:rPr lang="en-GB" sz="1000" dirty="0">
+                <a:latin typeface="Dcr10"/>
+              </a:rPr>
+              <a:t>It is proposed to solve this problem by ??? (did not get the meaning)</a:t>
+            </a:r>
+          </a:p>
+        </p:txBody>
+      </p:sp>
+      <p:pic>
+        <p:nvPicPr>
+          <p:cNvPr id="4" name="Picture 3">
+            <a:extLst>
+              <a:ext uri="{FF2B5EF4-FFF2-40B4-BE49-F238E27FC236}">
+                <a16:creationId xmlns:a16="http://schemas.microsoft.com/office/drawing/2014/main" id="{7CF4E76C-9D4D-7FA1-E1DE-968650260659}"/>
+              </a:ext>
+            </a:extLst>
+          </p:cNvPr>
+          <p:cNvPicPr>
+            <a:picLocks noChangeAspect="1"/>
+          </p:cNvPicPr>
+          <p:nvPr/>
+        </p:nvPicPr>
+        <p:blipFill>
+          <a:blip r:embed="rId5"/>
+          <a:stretch>
+            <a:fillRect/>
+          </a:stretch>
+        </p:blipFill>
+        <p:spPr>
+          <a:xfrm>
+            <a:off x="59041" y="7669555"/>
+            <a:ext cx="2921110" cy="1660567"/>
+          </a:xfrm>
+          <a:prstGeom prst="rect">
+            <a:avLst/>
+          </a:prstGeom>
+        </p:spPr>
+      </p:pic>
+      <p:sp>
+        <p:nvSpPr>
+          <p:cNvPr id="6" name="TextBox 5">
+            <a:extLst>
+              <a:ext uri="{FF2B5EF4-FFF2-40B4-BE49-F238E27FC236}">
+                <a16:creationId xmlns:a16="http://schemas.microsoft.com/office/drawing/2014/main" id="{95B0CE16-3B44-142B-41F6-845D7700BD4F}"/>
+              </a:ext>
+            </a:extLst>
+          </p:cNvPr>
+          <p:cNvSpPr txBox="1"/>
+          <p:nvPr/>
+        </p:nvSpPr>
+        <p:spPr>
+          <a:xfrm>
+            <a:off x="3411125" y="2786"/>
+            <a:ext cx="3524919" cy="1569660"/>
+          </a:xfrm>
+          <a:prstGeom prst="rect">
+            <a:avLst/>
+          </a:prstGeom>
+          <a:noFill/>
+        </p:spPr>
+        <p:txBody>
+          <a:bodyPr wrap="square">
+            <a:spAutoFit/>
+          </a:bodyPr>
+          <a:lstStyle/>
+          <a:p>
+            <a:pPr algn="just"/>
+            <a:r>
+              <a:rPr lang="en-US" sz="1200" b="1" dirty="0">
+                <a:solidFill>
+                  <a:srgbClr val="002060"/>
+                </a:solidFill>
+              </a:rPr>
+              <a:t>Estimation problem</a:t>
+            </a:r>
+          </a:p>
+          <a:p>
+            <a:endParaRPr lang="en-GB" sz="1200" b="1" dirty="0">
+              <a:solidFill>
+                <a:srgbClr val="002060"/>
+              </a:solidFill>
+              <a:effectLst/>
+              <a:latin typeface="Dcr10"/>
+            </a:endParaRPr>
+          </a:p>
+          <a:p>
+            <a:endParaRPr lang="en-GB" sz="1200" b="1" dirty="0">
+              <a:solidFill>
+                <a:srgbClr val="002060"/>
+              </a:solidFill>
+              <a:effectLst/>
+              <a:latin typeface="Dcr10"/>
+            </a:endParaRPr>
+          </a:p>
+          <a:p>
+            <a:endParaRPr lang="en-GB" sz="1200" b="1" dirty="0">
+              <a:solidFill>
+                <a:srgbClr val="002060"/>
+              </a:solidFill>
+              <a:latin typeface="Dcr10"/>
+            </a:endParaRPr>
+          </a:p>
+          <a:p>
+            <a:endParaRPr lang="en-GB" sz="1200" b="1" dirty="0">
+              <a:solidFill>
+                <a:srgbClr val="002060"/>
+              </a:solidFill>
+              <a:effectLst/>
+              <a:latin typeface="Dcr10"/>
+            </a:endParaRPr>
+          </a:p>
+          <a:p>
+            <a:endParaRPr lang="en-GB" sz="1200" b="1" dirty="0">
+              <a:solidFill>
+                <a:srgbClr val="002060"/>
+              </a:solidFill>
+              <a:effectLst/>
+              <a:latin typeface="Dcr10"/>
+            </a:endParaRPr>
+          </a:p>
+          <a:p>
+            <a:r>
+              <a:rPr lang="en-GB" sz="1200" dirty="0">
+                <a:latin typeface="Dcr10"/>
+              </a:rPr>
+              <a:t>SR of factor </a:t>
+            </a:r>
+          </a:p>
+          <a:p>
+            <a:r>
+              <a:rPr lang="en-GB" sz="1200" dirty="0">
+                <a:latin typeface="Dcr10"/>
+              </a:rPr>
+              <a:t>model is</a:t>
+            </a:r>
+            <a:endParaRPr lang="en-GB" sz="1000" dirty="0">
+              <a:effectLst/>
+              <a:latin typeface="Dcr10"/>
+            </a:endParaRPr>
+          </a:p>
+        </p:txBody>
+      </p:sp>
+      <p:pic>
+        <p:nvPicPr>
+          <p:cNvPr id="9" name="Picture 8">
+            <a:extLst>
+              <a:ext uri="{FF2B5EF4-FFF2-40B4-BE49-F238E27FC236}">
+                <a16:creationId xmlns:a16="http://schemas.microsoft.com/office/drawing/2014/main" id="{BA62FFB4-F3A2-FEA0-8144-E5279F6EEE1E}"/>
+              </a:ext>
+            </a:extLst>
+          </p:cNvPr>
+          <p:cNvPicPr>
+            <a:picLocks noChangeAspect="1"/>
+          </p:cNvPicPr>
+          <p:nvPr/>
+        </p:nvPicPr>
+        <p:blipFill>
+          <a:blip r:embed="rId6"/>
+          <a:stretch>
+            <a:fillRect/>
+          </a:stretch>
+        </p:blipFill>
+        <p:spPr>
+          <a:xfrm>
+            <a:off x="4334077" y="838649"/>
+            <a:ext cx="1437656" cy="1089133"/>
+          </a:xfrm>
+          <a:prstGeom prst="rect">
+            <a:avLst/>
+          </a:prstGeom>
+        </p:spPr>
+      </p:pic>
+      <p:pic>
+        <p:nvPicPr>
+          <p:cNvPr id="13" name="Picture 12">
+            <a:extLst>
+              <a:ext uri="{FF2B5EF4-FFF2-40B4-BE49-F238E27FC236}">
+                <a16:creationId xmlns:a16="http://schemas.microsoft.com/office/drawing/2014/main" id="{8BD18705-B28D-F927-7298-6A31BF9BA858}"/>
+              </a:ext>
+            </a:extLst>
+          </p:cNvPr>
+          <p:cNvPicPr>
+            <a:picLocks noChangeAspect="1"/>
+          </p:cNvPicPr>
+          <p:nvPr/>
+        </p:nvPicPr>
+        <p:blipFill>
+          <a:blip r:embed="rId7"/>
+          <a:stretch>
+            <a:fillRect/>
+          </a:stretch>
+        </p:blipFill>
+        <p:spPr>
+          <a:xfrm>
+            <a:off x="834204" y="1959479"/>
+            <a:ext cx="1914581" cy="206412"/>
+          </a:xfrm>
+          <a:prstGeom prst="rect">
+            <a:avLst/>
+          </a:prstGeom>
+        </p:spPr>
+      </p:pic>
+      <p:sp>
+        <p:nvSpPr>
+          <p:cNvPr id="16" name="TextBox 15">
+            <a:extLst>
+              <a:ext uri="{FF2B5EF4-FFF2-40B4-BE49-F238E27FC236}">
+                <a16:creationId xmlns:a16="http://schemas.microsoft.com/office/drawing/2014/main" id="{415852FC-B14D-6CFA-F83A-B95DCF0DBA16}"/>
+              </a:ext>
+            </a:extLst>
+          </p:cNvPr>
+          <p:cNvSpPr txBox="1"/>
+          <p:nvPr/>
+        </p:nvSpPr>
+        <p:spPr>
+          <a:xfrm>
+            <a:off x="3411125" y="239437"/>
+            <a:ext cx="3403743" cy="707886"/>
+          </a:xfrm>
+          <a:prstGeom prst="rect">
+            <a:avLst/>
+          </a:prstGeom>
+          <a:noFill/>
+        </p:spPr>
+        <p:txBody>
+          <a:bodyPr wrap="square">
+            <a:spAutoFit/>
+          </a:bodyPr>
+          <a:lstStyle/>
+          <a:p>
+            <a:pPr algn="just"/>
+            <a:r>
+              <a:rPr lang="en-GB" sz="1000" dirty="0">
+                <a:latin typeface="Dcr10"/>
+              </a:rPr>
+              <a:t>T</a:t>
+            </a:r>
+            <a:r>
+              <a:rPr lang="en-GB" sz="1000" dirty="0">
+                <a:effectLst/>
+                <a:latin typeface="Dcr10"/>
+              </a:rPr>
+              <a:t>he challenge involved in estimating the expected returns on individual assets has been replaced by the challenge involved in estimating the expected return on systematic factors, which is not any easier from a statistical standpoint </a:t>
+            </a:r>
+            <a:endParaRPr lang="en-GB" sz="1000" dirty="0"/>
+          </a:p>
+        </p:txBody>
+      </p:sp>
+      <p:sp>
+        <p:nvSpPr>
+          <p:cNvPr id="17" name="TextBox 16">
+            <a:extLst>
+              <a:ext uri="{FF2B5EF4-FFF2-40B4-BE49-F238E27FC236}">
+                <a16:creationId xmlns:a16="http://schemas.microsoft.com/office/drawing/2014/main" id="{F2645D78-D82F-7833-4BDC-962396FD20BC}"/>
+              </a:ext>
+            </a:extLst>
+          </p:cNvPr>
+          <p:cNvSpPr txBox="1"/>
+          <p:nvPr/>
+        </p:nvSpPr>
+        <p:spPr>
+          <a:xfrm>
+            <a:off x="3411124" y="1809097"/>
+            <a:ext cx="3403743" cy="1785104"/>
+          </a:xfrm>
+          <a:prstGeom prst="rect">
+            <a:avLst/>
+          </a:prstGeom>
+          <a:noFill/>
+        </p:spPr>
+        <p:txBody>
+          <a:bodyPr wrap="square">
+            <a:spAutoFit/>
+          </a:bodyPr>
+          <a:lstStyle/>
+          <a:p>
+            <a:pPr algn="just"/>
+            <a:r>
+              <a:rPr lang="en-GB" sz="1000" b="1" dirty="0">
+                <a:solidFill>
+                  <a:srgbClr val="002060"/>
+                </a:solidFill>
+                <a:highlight>
+                  <a:srgbClr val="FFFF00"/>
+                </a:highlight>
+                <a:latin typeface="Dcr10"/>
+              </a:rPr>
+              <a:t>Problem: </a:t>
+            </a:r>
+            <a:r>
+              <a:rPr lang="en-GB" sz="1000" dirty="0">
+                <a:highlight>
+                  <a:srgbClr val="FFFF00"/>
+                </a:highlight>
+                <a:latin typeface="Dcr10"/>
+              </a:rPr>
+              <a:t>no commonly accepted set of factors exist</a:t>
+            </a:r>
+          </a:p>
+          <a:p>
+            <a:pPr algn="just"/>
+            <a:r>
+              <a:rPr lang="en-GB" sz="1000" dirty="0">
+                <a:effectLst/>
+                <a:latin typeface="Dcr10"/>
+              </a:rPr>
+              <a:t>Within the equity class, more or less consensual explicit factors exist, like the three </a:t>
+            </a:r>
+            <a:r>
+              <a:rPr lang="en-GB" sz="1000" dirty="0" err="1">
+                <a:effectLst/>
+                <a:latin typeface="Dcr10"/>
+              </a:rPr>
+              <a:t>Fama</a:t>
+            </a:r>
+            <a:r>
+              <a:rPr lang="en-GB" sz="1000" dirty="0">
+                <a:effectLst/>
+                <a:latin typeface="Dcr10"/>
+              </a:rPr>
+              <a:t>-French factors (market, size and value) and a few additional factors that were uncovered by academic research (momentum, low volatility, investment and profitability) </a:t>
+            </a:r>
+            <a:endParaRPr lang="en-GB" sz="1000" dirty="0"/>
+          </a:p>
+          <a:p>
+            <a:pPr algn="just"/>
+            <a:r>
+              <a:rPr lang="en-GB" sz="1000" b="1" dirty="0">
+                <a:solidFill>
+                  <a:srgbClr val="002060"/>
+                </a:solidFill>
+                <a:effectLst/>
+                <a:latin typeface="Dcr10"/>
+              </a:rPr>
+              <a:t>factor mimicking portfolios can be regarded as the most meaningful building blocks for investment decisions </a:t>
+            </a:r>
+            <a:endParaRPr lang="en-GB" sz="1000" b="1" dirty="0">
+              <a:solidFill>
+                <a:srgbClr val="002060"/>
+              </a:solidFill>
+            </a:endParaRPr>
+          </a:p>
+          <a:p>
+            <a:pPr algn="just"/>
+            <a:r>
+              <a:rPr lang="en-GB" sz="1000" i="1" dirty="0">
+                <a:effectLst/>
+                <a:latin typeface="Dcr10"/>
+              </a:rPr>
+              <a:t>Eugene </a:t>
+            </a:r>
+            <a:r>
+              <a:rPr lang="en-GB" sz="1000" i="1" dirty="0" err="1">
+                <a:effectLst/>
+                <a:latin typeface="Dcr10"/>
+              </a:rPr>
+              <a:t>Fama</a:t>
+            </a:r>
+            <a:r>
+              <a:rPr lang="en-GB" sz="1000" i="1" dirty="0">
+                <a:effectLst/>
+                <a:latin typeface="Dcr10"/>
+              </a:rPr>
+              <a:t> "all we really say in finance is hold diversified portfolios along whatever tilt you choose." </a:t>
+            </a:r>
+            <a:endParaRPr lang="en-GB" sz="1000" i="1" dirty="0"/>
+          </a:p>
+          <a:p>
+            <a:pPr algn="just"/>
+            <a:endParaRPr lang="en-GB" sz="1000" dirty="0">
+              <a:highlight>
+                <a:srgbClr val="FFFF00"/>
+              </a:highlight>
+            </a:endParaRPr>
+          </a:p>
+        </p:txBody>
+      </p:sp>
+      <p:sp>
+        <p:nvSpPr>
+          <p:cNvPr id="18" name="TextBox 17">
+            <a:extLst>
+              <a:ext uri="{FF2B5EF4-FFF2-40B4-BE49-F238E27FC236}">
+                <a16:creationId xmlns:a16="http://schemas.microsoft.com/office/drawing/2014/main" id="{59FCB6A3-8093-3DC5-1894-10735FD105ED}"/>
+              </a:ext>
+            </a:extLst>
+          </p:cNvPr>
+          <p:cNvSpPr txBox="1"/>
+          <p:nvPr/>
+        </p:nvSpPr>
+        <p:spPr>
+          <a:xfrm>
+            <a:off x="3411125" y="3454708"/>
+            <a:ext cx="3524919" cy="4508927"/>
+          </a:xfrm>
+          <a:prstGeom prst="rect">
+            <a:avLst/>
+          </a:prstGeom>
+          <a:noFill/>
+        </p:spPr>
+        <p:txBody>
+          <a:bodyPr wrap="square">
+            <a:spAutoFit/>
+          </a:bodyPr>
+          <a:lstStyle/>
+          <a:p>
+            <a:pPr algn="just"/>
+            <a:r>
+              <a:rPr lang="en-US" sz="1200" b="1" dirty="0">
+                <a:solidFill>
+                  <a:srgbClr val="002060"/>
+                </a:solidFill>
+              </a:rPr>
+              <a:t>More problems so that you fill frustrated</a:t>
+            </a:r>
+          </a:p>
+          <a:p>
+            <a:pPr marL="171450" indent="-171450" algn="just">
+              <a:buFont typeface="Arial" panose="020B0604020202020204" pitchFamily="34" charset="0"/>
+              <a:buChar char="•"/>
+            </a:pPr>
+            <a:r>
+              <a:rPr lang="en-GB" sz="1000" dirty="0">
+                <a:effectLst/>
+                <a:latin typeface="Dcr10"/>
+              </a:rPr>
+              <a:t>each decentralized asset manager is tasked with managing a sub- component of the whole investor portfolio =&gt; no optimal choice</a:t>
+            </a:r>
+            <a:endParaRPr lang="en-GB" sz="1000" dirty="0"/>
+          </a:p>
+          <a:p>
+            <a:pPr marL="171450" indent="-171450" algn="just">
+              <a:buFont typeface="Arial" panose="020B0604020202020204" pitchFamily="34" charset="0"/>
+              <a:buChar char="•"/>
+            </a:pPr>
+            <a:r>
+              <a:rPr lang="en-GB" sz="1000" dirty="0">
+                <a:effectLst/>
+                <a:latin typeface="Dcr10"/>
+              </a:rPr>
+              <a:t>if the manager is in charge of the whole PSP, a pure focus on the expected return and the volatility of their portfolio is only rational </a:t>
+            </a:r>
+            <a:r>
+              <a:rPr lang="en-GB" sz="1000" b="1" dirty="0">
+                <a:solidFill>
+                  <a:srgbClr val="002060"/>
+                </a:solidFill>
+                <a:effectLst/>
+                <a:latin typeface="Dcr10"/>
+              </a:rPr>
+              <a:t>in the absence of liabilities</a:t>
+            </a:r>
+            <a:r>
+              <a:rPr lang="en-GB" sz="1000" dirty="0">
+                <a:effectLst/>
+                <a:latin typeface="Dcr10"/>
+              </a:rPr>
+              <a:t>. For liability-driven investors, relative risk is a more meaningful objective </a:t>
+            </a:r>
+          </a:p>
+          <a:p>
+            <a:pPr marL="171450" indent="-171450" algn="just">
+              <a:buFont typeface="Arial" panose="020B0604020202020204" pitchFamily="34" charset="0"/>
+              <a:buChar char="•"/>
+            </a:pPr>
+            <a:r>
+              <a:rPr lang="en-GB" sz="1000" dirty="0">
+                <a:effectLst/>
+                <a:latin typeface="Dcr10"/>
+              </a:rPr>
+              <a:t>personalized suitability within the investment solution under consideration </a:t>
+            </a:r>
+            <a:endParaRPr lang="en-GB" sz="1000" dirty="0"/>
+          </a:p>
+          <a:p>
+            <a:pPr marL="171450" indent="-171450" algn="just">
+              <a:buFont typeface="Arial" panose="020B0604020202020204" pitchFamily="34" charset="0"/>
+              <a:buChar char="•"/>
+            </a:pPr>
+            <a:endParaRPr lang="en-GB" sz="1000" dirty="0"/>
+          </a:p>
+          <a:p>
+            <a:pPr marL="171450" indent="-171450" algn="just">
+              <a:buFont typeface="Arial" panose="020B0604020202020204" pitchFamily="34" charset="0"/>
+              <a:buChar char="•"/>
+            </a:pPr>
+            <a:endParaRPr lang="en-GB" sz="1000" dirty="0"/>
+          </a:p>
+          <a:p>
+            <a:pPr algn="just"/>
+            <a:r>
+              <a:rPr lang="en-GB" sz="1200" dirty="0">
+                <a:effectLst/>
+                <a:latin typeface="Dcr10"/>
+              </a:rPr>
+              <a:t>Optimal PSP can be </a:t>
+            </a:r>
+            <a:r>
+              <a:rPr lang="en-GB" sz="1200" dirty="0" err="1">
+                <a:effectLst/>
+                <a:latin typeface="Dcr10"/>
+              </a:rPr>
+              <a:t>repre</a:t>
+            </a:r>
+            <a:r>
+              <a:rPr lang="en-GB" sz="1200" dirty="0">
+                <a:effectLst/>
+                <a:latin typeface="Dcr10"/>
+              </a:rPr>
+              <a:t>- </a:t>
+            </a:r>
+            <a:r>
+              <a:rPr lang="en-GB" sz="1200" dirty="0" err="1">
+                <a:effectLst/>
+                <a:latin typeface="Dcr10"/>
+              </a:rPr>
+              <a:t>sented</a:t>
+            </a:r>
+            <a:r>
+              <a:rPr lang="en-GB" sz="1200" dirty="0">
+                <a:effectLst/>
+                <a:latin typeface="Dcr10"/>
+              </a:rPr>
+              <a:t> as a combination of several funds, which involves MSR portfolio plus one or more other fund(s). MSR portfolio alone is in general suboptimal. For example , it can be GMV + “most liability-friendly” (MLF) portfolio, which maximizes the correlation with liabilities </a:t>
+            </a:r>
+            <a:endParaRPr lang="en-GB" sz="1200" dirty="0"/>
+          </a:p>
+          <a:p>
+            <a:pPr algn="just"/>
+            <a:r>
+              <a:rPr lang="en-GB" sz="1200" dirty="0"/>
+              <a:t>Why do not we do GHP portfolio for liabilities?</a:t>
+            </a:r>
+          </a:p>
+          <a:p>
+            <a:pPr algn="just"/>
+            <a:endParaRPr lang="en-GB" sz="1000" dirty="0">
+              <a:effectLst/>
+              <a:latin typeface="Dcr10"/>
+            </a:endParaRPr>
+          </a:p>
+          <a:p>
+            <a:pPr algn="just"/>
+            <a:r>
+              <a:rPr lang="en-GB" sz="1000" dirty="0">
+                <a:effectLst/>
+                <a:latin typeface="Dcr10"/>
+              </a:rPr>
+              <a:t>[for more details see </a:t>
+            </a:r>
+            <a:r>
+              <a:rPr lang="en-GB" sz="1000" dirty="0">
+                <a:effectLst/>
+                <a:latin typeface="Dcbx10"/>
+              </a:rPr>
+              <a:t>Reading: Precision investing ]</a:t>
+            </a:r>
+            <a:endParaRPr lang="en-GB" sz="1000" dirty="0"/>
+          </a:p>
+          <a:p>
+            <a:pPr algn="just"/>
+            <a:r>
+              <a:rPr lang="en-GB" sz="1000" b="1" dirty="0">
+                <a:solidFill>
+                  <a:srgbClr val="002060"/>
+                </a:solidFill>
+                <a:effectLst/>
+                <a:latin typeface="Dcr10"/>
+              </a:rPr>
+              <a:t>meeting investor needs is the "new alpha”. </a:t>
+            </a:r>
+            <a:r>
+              <a:rPr lang="en-GB" sz="1000" dirty="0">
+                <a:effectLst/>
+                <a:latin typeface="Dcr10"/>
+              </a:rPr>
+              <a:t>an ability to produce and distribute suitably designed performance portfolios adapted to liability-driven investor-specific goals and constraints will likely mark a key step forward from the traditional focus on promoting one-size-fits-all products on the basis of their alleged outperformance </a:t>
+            </a:r>
+            <a:endParaRPr lang="en-US" sz="1000" dirty="0"/>
+          </a:p>
+          <a:p>
+            <a:pPr marL="171450" indent="-171450" algn="just">
+              <a:buFont typeface="Arial" panose="020B0604020202020204" pitchFamily="34" charset="0"/>
+              <a:buChar char="•"/>
+            </a:pPr>
+            <a:endParaRPr lang="en-US" sz="100" b="1" dirty="0">
+              <a:solidFill>
+                <a:srgbClr val="002060"/>
+              </a:solidFill>
+            </a:endParaRPr>
           </a:p>
         </p:txBody>
       </p:sp>
@@ -9888,7 +10501,7 @@
                 </a:solidFill>
                 <a:latin typeface="Dcr10"/>
               </a:rPr>
-              <a:t>Passive vs Active Portfolio Management</a:t>
+              <a:t>Passive vs Active Portfolio Management (lecture 2)</a:t>
             </a:r>
           </a:p>
           <a:p>
@@ -10057,7 +10670,7 @@
         <p:spPr>
           <a:xfrm>
             <a:off x="-2059" y="4643022"/>
-            <a:ext cx="3431058" cy="1969770"/>
+            <a:ext cx="3431058" cy="3477875"/>
           </a:xfrm>
           <a:prstGeom prst="rect">
             <a:avLst/>
@@ -10084,7 +10697,80 @@
             <a:pPr algn="just"/>
             <a:r>
               <a:rPr lang="en-GB" sz="1000" dirty="0"/>
-              <a:t>No, it is not! Cap-weighted indexes are poorly diversified portfolios. You are not rewarded enough for the risk you are taking. You are harvesting only half of what you could have got. It was assumed to be tangency portfolio, but it was misunderstanding of CAPM.</a:t>
+              <a:t>No, it is not! Because:</a:t>
+            </a:r>
+          </a:p>
+          <a:p>
+            <a:pPr marL="228600" indent="-228600" algn="just">
+              <a:buAutoNum type="arabicParenR"/>
+            </a:pPr>
+            <a:r>
+              <a:rPr lang="en-GB" sz="1000" dirty="0"/>
+              <a:t>Cap-weighted indexes are </a:t>
+            </a:r>
+            <a:r>
+              <a:rPr lang="en-GB" sz="1000" b="1" dirty="0">
+                <a:solidFill>
+                  <a:srgbClr val="002060"/>
+                </a:solidFill>
+              </a:rPr>
+              <a:t>inefficiently diversify</a:t>
+            </a:r>
+            <a:r>
+              <a:rPr lang="en-GB" sz="1800" dirty="0">
+                <a:effectLst/>
+                <a:latin typeface="ArialMT"/>
+              </a:rPr>
+              <a:t> </a:t>
+            </a:r>
+            <a:r>
+              <a:rPr lang="en-GB" sz="1000" b="1" dirty="0">
+                <a:solidFill>
+                  <a:srgbClr val="002060"/>
+                </a:solidFill>
+                <a:effectLst/>
+              </a:rPr>
+              <a:t>unrewarded specific risks </a:t>
+            </a:r>
+            <a:r>
+              <a:rPr lang="en-GB" sz="1000" dirty="0">
+                <a:effectLst/>
+              </a:rPr>
+              <a:t>due to strong concentration in large cap.</a:t>
+            </a:r>
+            <a:r>
+              <a:rPr lang="en-GB" sz="1000" b="1" dirty="0">
+                <a:solidFill>
+                  <a:srgbClr val="002060"/>
+                </a:solidFill>
+                <a:effectLst/>
+              </a:rPr>
+              <a:t> </a:t>
+            </a:r>
+            <a:r>
+              <a:rPr lang="en-GB" sz="1000" dirty="0"/>
+              <a:t>You are not rewarded enough for the risk you are taking. You are harvesting only half of what you could have got. It was assumed to be tangency portfolio, but it was misunderstanding of CAPM.</a:t>
+            </a:r>
+          </a:p>
+          <a:p>
+            <a:pPr marL="228600" indent="-228600" algn="just">
+              <a:buAutoNum type="arabicParenR"/>
+            </a:pPr>
+            <a:r>
+              <a:rPr lang="en-GB" sz="1000" dirty="0"/>
+              <a:t>Cap-weighted indexes </a:t>
+            </a:r>
+            <a:r>
+              <a:rPr lang="en-GB" sz="1000" b="1" dirty="0">
+                <a:solidFill>
+                  <a:srgbClr val="002060"/>
+                </a:solidFill>
+              </a:rPr>
+              <a:t>provide inefficient exposure to rewarded specific risks</a:t>
+            </a:r>
+            <a:r>
+              <a:rPr lang="en-GB" sz="1000" dirty="0"/>
+              <a:t>.</a:t>
             </a:r>
           </a:p>
           <a:p>
@@ -10095,13 +10781,1352 @@
             <a:pPr algn="just"/>
             <a:r>
               <a:rPr lang="en-GB" sz="1000" dirty="0"/>
-              <a:t>In 2003 Shwartz showed that S&amp;P500 is way worse than an optimal Markowitz portfolio. Of course, it was ex-post in-sample =&gt; not that viable. However, the difference of real tangency portfolio and S&amp;P was very big. Therefore, there began a search for a </a:t>
-            </a:r>
-            <a:r>
-              <a:rPr lang="en-GB" sz="1000"/>
-              <a:t>better portfolio.</a:t>
-            </a:r>
+              <a:t>In 2003 Shwartz showed that S&amp;P500 is way worse than an optimal Markowitz portfolio. Of course, it was ex-post in-sample =&gt; not that viable. However, the difference of real tangency portfolio and S&amp;P was very big. Therefore, there began a search for a better portfolio.</a:t>
+            </a:r>
+          </a:p>
+          <a:p>
+            <a:pPr algn="just"/>
             <a:endParaRPr lang="en-GB" sz="1000" dirty="0"/>
+          </a:p>
+          <a:p>
+            <a:pPr algn="just"/>
+            <a:r>
+              <a:rPr lang="en-GB" sz="1000" dirty="0"/>
+              <a:t>Also something as naïve as 1/N outperforms S&amp;P500 =&gt; this is argument for being bad, not for 1/N being good. So, cap-weighted is an ok proxy to understand the market, but not good portfolio to invest in</a:t>
+            </a:r>
+          </a:p>
+        </p:txBody>
+      </p:sp>
+      <p:cxnSp>
+        <p:nvCxnSpPr>
+          <p:cNvPr id="18" name="Straight Connector 17">
+            <a:extLst>
+              <a:ext uri="{FF2B5EF4-FFF2-40B4-BE49-F238E27FC236}">
+                <a16:creationId xmlns:a16="http://schemas.microsoft.com/office/drawing/2014/main" id="{0C57D2A2-472E-F41A-8568-2BF1BA5260DC}"/>
+              </a:ext>
+            </a:extLst>
+          </p:cNvPr>
+          <p:cNvCxnSpPr>
+            <a:cxnSpLocks/>
+          </p:cNvCxnSpPr>
+          <p:nvPr/>
+        </p:nvCxnSpPr>
+        <p:spPr>
+          <a:xfrm>
+            <a:off x="419938" y="9307926"/>
+            <a:ext cx="2269442" cy="0"/>
+          </a:xfrm>
+          <a:prstGeom prst="line">
+            <a:avLst/>
+          </a:prstGeom>
+          <a:ln w="9525">
+            <a:solidFill>
+              <a:schemeClr val="tx1"/>
+            </a:solidFill>
+          </a:ln>
+        </p:spPr>
+        <p:style>
+          <a:lnRef idx="1">
+            <a:schemeClr val="accent1"/>
+          </a:lnRef>
+          <a:fillRef idx="0">
+            <a:schemeClr val="accent1"/>
+          </a:fillRef>
+          <a:effectRef idx="0">
+            <a:schemeClr val="accent1"/>
+          </a:effectRef>
+          <a:fontRef idx="minor">
+            <a:schemeClr val="tx1"/>
+          </a:fontRef>
+        </p:style>
+      </p:cxnSp>
+      <p:cxnSp>
+        <p:nvCxnSpPr>
+          <p:cNvPr id="19" name="Straight Connector 18">
+            <a:extLst>
+              <a:ext uri="{FF2B5EF4-FFF2-40B4-BE49-F238E27FC236}">
+                <a16:creationId xmlns:a16="http://schemas.microsoft.com/office/drawing/2014/main" id="{9179CE17-B8F9-BBE2-CF82-4EC9149DC001}"/>
+              </a:ext>
+            </a:extLst>
+          </p:cNvPr>
+          <p:cNvCxnSpPr>
+            <a:cxnSpLocks/>
+          </p:cNvCxnSpPr>
+          <p:nvPr/>
+        </p:nvCxnSpPr>
+        <p:spPr>
+          <a:xfrm>
+            <a:off x="419938" y="8279246"/>
+            <a:ext cx="0" cy="1028680"/>
+          </a:xfrm>
+          <a:prstGeom prst="line">
+            <a:avLst/>
+          </a:prstGeom>
+          <a:ln w="9525">
+            <a:solidFill>
+              <a:schemeClr val="tx1"/>
+            </a:solidFill>
+          </a:ln>
+        </p:spPr>
+        <p:style>
+          <a:lnRef idx="1">
+            <a:schemeClr val="accent1"/>
+          </a:lnRef>
+          <a:fillRef idx="0">
+            <a:schemeClr val="accent1"/>
+          </a:fillRef>
+          <a:effectRef idx="0">
+            <a:schemeClr val="accent1"/>
+          </a:effectRef>
+          <a:fontRef idx="minor">
+            <a:schemeClr val="tx1"/>
+          </a:fontRef>
+        </p:style>
+      </p:cxnSp>
+      <p:sp>
+        <p:nvSpPr>
+          <p:cNvPr id="20" name="Oval 19">
+            <a:extLst>
+              <a:ext uri="{FF2B5EF4-FFF2-40B4-BE49-F238E27FC236}">
+                <a16:creationId xmlns:a16="http://schemas.microsoft.com/office/drawing/2014/main" id="{D41AD90F-DF6D-3252-8DF8-E46C88AC1ACD}"/>
+              </a:ext>
+            </a:extLst>
+          </p:cNvPr>
+          <p:cNvSpPr/>
+          <p:nvPr/>
+        </p:nvSpPr>
+        <p:spPr>
+          <a:xfrm>
+            <a:off x="1005822" y="8644390"/>
+            <a:ext cx="117513" cy="117513"/>
+          </a:xfrm>
+          <a:prstGeom prst="ellipse">
+            <a:avLst/>
+          </a:prstGeom>
+          <a:solidFill>
+            <a:schemeClr val="tx1"/>
+          </a:solidFill>
+          <a:ln>
+            <a:noFill/>
+          </a:ln>
+        </p:spPr>
+        <p:style>
+          <a:lnRef idx="2">
+            <a:schemeClr val="accent1">
+              <a:shade val="15000"/>
+            </a:schemeClr>
+          </a:lnRef>
+          <a:fillRef idx="1">
+            <a:schemeClr val="accent1"/>
+          </a:fillRef>
+          <a:effectRef idx="0">
+            <a:schemeClr val="accent1"/>
+          </a:effectRef>
+          <a:fontRef idx="minor">
+            <a:schemeClr val="lt1"/>
+          </a:fontRef>
+        </p:style>
+        <p:txBody>
+          <a:bodyPr rtlCol="0" anchor="ctr"/>
+          <a:lstStyle/>
+          <a:p>
+            <a:pPr algn="ctr"/>
+            <a:endParaRPr lang="en-FR"/>
+          </a:p>
+        </p:txBody>
+      </p:sp>
+      <p:sp>
+        <p:nvSpPr>
+          <p:cNvPr id="24" name="TextBox 23">
+            <a:extLst>
+              <a:ext uri="{FF2B5EF4-FFF2-40B4-BE49-F238E27FC236}">
+                <a16:creationId xmlns:a16="http://schemas.microsoft.com/office/drawing/2014/main" id="{D631C8C8-7C58-EB41-BD1A-94A7B49B8BD5}"/>
+              </a:ext>
+            </a:extLst>
+          </p:cNvPr>
+          <p:cNvSpPr txBox="1"/>
+          <p:nvPr/>
+        </p:nvSpPr>
+        <p:spPr>
+          <a:xfrm>
+            <a:off x="804967" y="8472081"/>
+            <a:ext cx="600212" cy="246221"/>
+          </a:xfrm>
+          <a:prstGeom prst="rect">
+            <a:avLst/>
+          </a:prstGeom>
+          <a:noFill/>
+        </p:spPr>
+        <p:txBody>
+          <a:bodyPr wrap="square" rtlCol="0">
+            <a:spAutoFit/>
+          </a:bodyPr>
+          <a:lstStyle/>
+          <a:p>
+            <a:r>
+              <a:rPr lang="en-FR" sz="1000" dirty="0"/>
+              <a:t>MSR</a:t>
+            </a:r>
+          </a:p>
+        </p:txBody>
+      </p:sp>
+      <p:sp>
+        <p:nvSpPr>
+          <p:cNvPr id="26" name="Triangle 25">
+            <a:extLst>
+              <a:ext uri="{FF2B5EF4-FFF2-40B4-BE49-F238E27FC236}">
+                <a16:creationId xmlns:a16="http://schemas.microsoft.com/office/drawing/2014/main" id="{FB924D69-2062-3945-05C3-D4F695FB15F3}"/>
+              </a:ext>
+            </a:extLst>
+          </p:cNvPr>
+          <p:cNvSpPr/>
+          <p:nvPr/>
+        </p:nvSpPr>
+        <p:spPr>
+          <a:xfrm>
+            <a:off x="387228" y="8235567"/>
+            <a:ext cx="73219" cy="63120"/>
+          </a:xfrm>
+          <a:prstGeom prst="triangle">
+            <a:avLst/>
+          </a:prstGeom>
+          <a:solidFill>
+            <a:schemeClr val="tx1"/>
+          </a:solidFill>
+          <a:ln>
+            <a:noFill/>
+          </a:ln>
+        </p:spPr>
+        <p:style>
+          <a:lnRef idx="2">
+            <a:schemeClr val="accent1">
+              <a:shade val="15000"/>
+            </a:schemeClr>
+          </a:lnRef>
+          <a:fillRef idx="1">
+            <a:schemeClr val="accent1"/>
+          </a:fillRef>
+          <a:effectRef idx="0">
+            <a:schemeClr val="accent1"/>
+          </a:effectRef>
+          <a:fontRef idx="minor">
+            <a:schemeClr val="lt1"/>
+          </a:fontRef>
+        </p:style>
+        <p:txBody>
+          <a:bodyPr rtlCol="0" anchor="ctr"/>
+          <a:lstStyle/>
+          <a:p>
+            <a:pPr algn="ctr"/>
+            <a:endParaRPr lang="en-FR"/>
+          </a:p>
+        </p:txBody>
+      </p:sp>
+      <p:sp>
+        <p:nvSpPr>
+          <p:cNvPr id="28" name="Triangle 27">
+            <a:extLst>
+              <a:ext uri="{FF2B5EF4-FFF2-40B4-BE49-F238E27FC236}">
+                <a16:creationId xmlns:a16="http://schemas.microsoft.com/office/drawing/2014/main" id="{835BA373-1F9B-04E2-E866-550E3067C986}"/>
+              </a:ext>
+            </a:extLst>
+          </p:cNvPr>
+          <p:cNvSpPr/>
+          <p:nvPr/>
+        </p:nvSpPr>
+        <p:spPr>
+          <a:xfrm rot="5400000">
+            <a:off x="2658010" y="9277113"/>
+            <a:ext cx="73219" cy="63120"/>
+          </a:xfrm>
+          <a:prstGeom prst="triangle">
+            <a:avLst/>
+          </a:prstGeom>
+          <a:solidFill>
+            <a:schemeClr val="tx1"/>
+          </a:solidFill>
+          <a:ln>
+            <a:noFill/>
+          </a:ln>
+        </p:spPr>
+        <p:style>
+          <a:lnRef idx="2">
+            <a:schemeClr val="accent1">
+              <a:shade val="15000"/>
+            </a:schemeClr>
+          </a:lnRef>
+          <a:fillRef idx="1">
+            <a:schemeClr val="accent1"/>
+          </a:fillRef>
+          <a:effectRef idx="0">
+            <a:schemeClr val="accent1"/>
+          </a:effectRef>
+          <a:fontRef idx="minor">
+            <a:schemeClr val="lt1"/>
+          </a:fontRef>
+        </p:style>
+        <p:txBody>
+          <a:bodyPr rtlCol="0" anchor="ctr"/>
+          <a:lstStyle/>
+          <a:p>
+            <a:pPr algn="ctr"/>
+            <a:endParaRPr lang="en-FR"/>
+          </a:p>
+        </p:txBody>
+      </p:sp>
+      <mc:AlternateContent xmlns:mc="http://schemas.openxmlformats.org/markup-compatibility/2006" xmlns:a14="http://schemas.microsoft.com/office/drawing/2010/main">
+        <mc:Choice Requires="a14">
+          <p:sp>
+            <p:nvSpPr>
+              <p:cNvPr id="29" name="TextBox 28">
+                <a:extLst>
+                  <a:ext uri="{FF2B5EF4-FFF2-40B4-BE49-F238E27FC236}">
+                    <a16:creationId xmlns:a16="http://schemas.microsoft.com/office/drawing/2014/main" id="{C4E1B9DC-36D5-DF77-F61D-0ADAA1D8190D}"/>
+                  </a:ext>
+                </a:extLst>
+              </p:cNvPr>
+              <p:cNvSpPr txBox="1"/>
+              <p:nvPr/>
+            </p:nvSpPr>
+            <p:spPr>
+              <a:xfrm>
+                <a:off x="2240501" y="9138492"/>
+                <a:ext cx="1092488" cy="215444"/>
+              </a:xfrm>
+              <a:prstGeom prst="rect">
+                <a:avLst/>
+              </a:prstGeom>
+              <a:noFill/>
+            </p:spPr>
+            <p:txBody>
+              <a:bodyPr wrap="square" rtlCol="0">
+                <a:spAutoFit/>
+              </a:bodyPr>
+              <a:lstStyle/>
+              <a:p>
+                <a:pPr/>
+                <a14:m>
+                  <m:oMathPara xmlns:m="http://schemas.openxmlformats.org/officeDocument/2006/math">
+                    <m:oMathParaPr>
+                      <m:jc m:val="centerGroup"/>
+                    </m:oMathParaPr>
+                    <m:oMath xmlns:m="http://schemas.openxmlformats.org/officeDocument/2006/math">
+                      <m:r>
+                        <a:rPr lang="en-US" sz="800" b="0" i="1" smtClean="0">
+                          <a:latin typeface="Cambria Math" panose="02040503050406030204" pitchFamily="18" charset="0"/>
+                        </a:rPr>
+                        <m:t>𝜎</m:t>
+                      </m:r>
+                    </m:oMath>
+                  </m:oMathPara>
+                </a14:m>
+                <a:endParaRPr lang="en-FR" sz="800" dirty="0"/>
+              </a:p>
+            </p:txBody>
+          </p:sp>
+        </mc:Choice>
+        <mc:Fallback xmlns="">
+          <p:sp>
+            <p:nvSpPr>
+              <p:cNvPr id="29" name="TextBox 28">
+                <a:extLst>
+                  <a:ext uri="{FF2B5EF4-FFF2-40B4-BE49-F238E27FC236}">
+                    <a16:creationId xmlns:a16="http://schemas.microsoft.com/office/drawing/2014/main" id="{C4E1B9DC-36D5-DF77-F61D-0ADAA1D8190D}"/>
+                  </a:ext>
+                </a:extLst>
+              </p:cNvPr>
+              <p:cNvSpPr txBox="1">
+                <a:spLocks noRot="1" noChangeAspect="1" noMove="1" noResize="1" noEditPoints="1" noAdjustHandles="1" noChangeArrowheads="1" noChangeShapeType="1" noTextEdit="1"/>
+              </p:cNvSpPr>
+              <p:nvPr/>
+            </p:nvSpPr>
+            <p:spPr>
+              <a:xfrm>
+                <a:off x="2240501" y="9138492"/>
+                <a:ext cx="1092488" cy="215444"/>
+              </a:xfrm>
+              <a:prstGeom prst="rect">
+                <a:avLst/>
+              </a:prstGeom>
+              <a:blipFill>
+                <a:blip r:embed="rId2"/>
+                <a:stretch>
+                  <a:fillRect/>
+                </a:stretch>
+              </a:blipFill>
+            </p:spPr>
+            <p:txBody>
+              <a:bodyPr/>
+              <a:lstStyle/>
+              <a:p>
+                <a:r>
+                  <a:rPr lang="en-FR">
+                    <a:noFill/>
+                  </a:rPr>
+                  <a:t> </a:t>
+                </a:r>
+              </a:p>
+            </p:txBody>
+          </p:sp>
+        </mc:Fallback>
+      </mc:AlternateContent>
+      <p:sp>
+        <p:nvSpPr>
+          <p:cNvPr id="32" name="Arc 31">
+            <a:extLst>
+              <a:ext uri="{FF2B5EF4-FFF2-40B4-BE49-F238E27FC236}">
+                <a16:creationId xmlns:a16="http://schemas.microsoft.com/office/drawing/2014/main" id="{CD825320-88F4-5780-08D5-DE3139BF3504}"/>
+              </a:ext>
+            </a:extLst>
+          </p:cNvPr>
+          <p:cNvSpPr/>
+          <p:nvPr/>
+        </p:nvSpPr>
+        <p:spPr>
+          <a:xfrm flipH="1">
+            <a:off x="693163" y="8422977"/>
+            <a:ext cx="3135086" cy="1698172"/>
+          </a:xfrm>
+          <a:prstGeom prst="arc">
+            <a:avLst/>
+          </a:prstGeom>
+          <a:ln w="12700">
+            <a:solidFill>
+              <a:srgbClr val="002060"/>
+            </a:solidFill>
+          </a:ln>
+        </p:spPr>
+        <p:style>
+          <a:lnRef idx="1">
+            <a:schemeClr val="accent1"/>
+          </a:lnRef>
+          <a:fillRef idx="0">
+            <a:schemeClr val="accent1"/>
+          </a:fillRef>
+          <a:effectRef idx="0">
+            <a:schemeClr val="accent1"/>
+          </a:effectRef>
+          <a:fontRef idx="minor">
+            <a:schemeClr val="tx1"/>
+          </a:fontRef>
+        </p:style>
+        <p:txBody>
+          <a:bodyPr rtlCol="0" anchor="ctr"/>
+          <a:lstStyle/>
+          <a:p>
+            <a:pPr algn="ctr"/>
+            <a:endParaRPr lang="en-FR"/>
+          </a:p>
+        </p:txBody>
+      </p:sp>
+      <mc:AlternateContent xmlns:mc="http://schemas.openxmlformats.org/markup-compatibility/2006" xmlns:a14="http://schemas.microsoft.com/office/drawing/2010/main">
+        <mc:Choice Requires="a14">
+          <p:sp>
+            <p:nvSpPr>
+              <p:cNvPr id="33" name="TextBox 32">
+                <a:extLst>
+                  <a:ext uri="{FF2B5EF4-FFF2-40B4-BE49-F238E27FC236}">
+                    <a16:creationId xmlns:a16="http://schemas.microsoft.com/office/drawing/2014/main" id="{FF9D5D7C-EF53-BBC5-FB06-BE5364C863EC}"/>
+                  </a:ext>
+                </a:extLst>
+              </p:cNvPr>
+              <p:cNvSpPr txBox="1"/>
+              <p:nvPr/>
+            </p:nvSpPr>
+            <p:spPr>
+              <a:xfrm>
+                <a:off x="-2059" y="8127846"/>
+                <a:ext cx="600212" cy="215444"/>
+              </a:xfrm>
+              <a:prstGeom prst="rect">
+                <a:avLst/>
+              </a:prstGeom>
+              <a:noFill/>
+            </p:spPr>
+            <p:txBody>
+              <a:bodyPr wrap="square" rtlCol="0">
+                <a:spAutoFit/>
+              </a:bodyPr>
+              <a:lstStyle/>
+              <a:p>
+                <a:pPr/>
+                <a14:m>
+                  <m:oMathPara xmlns:m="http://schemas.openxmlformats.org/officeDocument/2006/math">
+                    <m:oMathParaPr>
+                      <m:jc m:val="centerGroup"/>
+                    </m:oMathParaPr>
+                    <m:oMath xmlns:m="http://schemas.openxmlformats.org/officeDocument/2006/math">
+                      <m:r>
+                        <a:rPr lang="en-US" sz="800" b="0" i="1" dirty="0" smtClean="0">
+                          <a:latin typeface="Cambria Math" panose="02040503050406030204" pitchFamily="18" charset="0"/>
+                        </a:rPr>
+                        <m:t>𝜇</m:t>
+                      </m:r>
+                    </m:oMath>
+                  </m:oMathPara>
+                </a14:m>
+                <a:endParaRPr lang="en-FR" sz="800" dirty="0"/>
+              </a:p>
+            </p:txBody>
+          </p:sp>
+        </mc:Choice>
+        <mc:Fallback xmlns="">
+          <p:sp>
+            <p:nvSpPr>
+              <p:cNvPr id="33" name="TextBox 32">
+                <a:extLst>
+                  <a:ext uri="{FF2B5EF4-FFF2-40B4-BE49-F238E27FC236}">
+                    <a16:creationId xmlns:a16="http://schemas.microsoft.com/office/drawing/2014/main" id="{FF9D5D7C-EF53-BBC5-FB06-BE5364C863EC}"/>
+                  </a:ext>
+                </a:extLst>
+              </p:cNvPr>
+              <p:cNvSpPr txBox="1">
+                <a:spLocks noRot="1" noChangeAspect="1" noMove="1" noResize="1" noEditPoints="1" noAdjustHandles="1" noChangeArrowheads="1" noChangeShapeType="1" noTextEdit="1"/>
+              </p:cNvSpPr>
+              <p:nvPr/>
+            </p:nvSpPr>
+            <p:spPr>
+              <a:xfrm>
+                <a:off x="-2059" y="8127846"/>
+                <a:ext cx="600212" cy="215444"/>
+              </a:xfrm>
+              <a:prstGeom prst="rect">
+                <a:avLst/>
+              </a:prstGeom>
+              <a:blipFill>
+                <a:blip r:embed="rId3"/>
+                <a:stretch>
+                  <a:fillRect/>
+                </a:stretch>
+              </a:blipFill>
+            </p:spPr>
+            <p:txBody>
+              <a:bodyPr/>
+              <a:lstStyle/>
+              <a:p>
+                <a:r>
+                  <a:rPr lang="en-FR">
+                    <a:noFill/>
+                  </a:rPr>
+                  <a:t> </a:t>
+                </a:r>
+              </a:p>
+            </p:txBody>
+          </p:sp>
+        </mc:Fallback>
+      </mc:AlternateContent>
+      <p:sp>
+        <p:nvSpPr>
+          <p:cNvPr id="35" name="Oval 34">
+            <a:extLst>
+              <a:ext uri="{FF2B5EF4-FFF2-40B4-BE49-F238E27FC236}">
+                <a16:creationId xmlns:a16="http://schemas.microsoft.com/office/drawing/2014/main" id="{18815CEE-5F33-9BD5-23B2-22EFDC6D7EFF}"/>
+              </a:ext>
+            </a:extLst>
+          </p:cNvPr>
+          <p:cNvSpPr/>
+          <p:nvPr/>
+        </p:nvSpPr>
+        <p:spPr>
+          <a:xfrm>
+            <a:off x="1474073" y="8895601"/>
+            <a:ext cx="117513" cy="117513"/>
+          </a:xfrm>
+          <a:prstGeom prst="ellipse">
+            <a:avLst/>
+          </a:prstGeom>
+          <a:solidFill>
+            <a:schemeClr val="tx1"/>
+          </a:solidFill>
+          <a:ln>
+            <a:noFill/>
+          </a:ln>
+        </p:spPr>
+        <p:style>
+          <a:lnRef idx="2">
+            <a:schemeClr val="accent1">
+              <a:shade val="15000"/>
+            </a:schemeClr>
+          </a:lnRef>
+          <a:fillRef idx="1">
+            <a:schemeClr val="accent1"/>
+          </a:fillRef>
+          <a:effectRef idx="0">
+            <a:schemeClr val="accent1"/>
+          </a:effectRef>
+          <a:fontRef idx="minor">
+            <a:schemeClr val="lt1"/>
+          </a:fontRef>
+        </p:style>
+        <p:txBody>
+          <a:bodyPr rtlCol="0" anchor="ctr"/>
+          <a:lstStyle/>
+          <a:p>
+            <a:pPr algn="ctr"/>
+            <a:endParaRPr lang="en-FR"/>
+          </a:p>
+        </p:txBody>
+      </p:sp>
+      <p:sp>
+        <p:nvSpPr>
+          <p:cNvPr id="36" name="TextBox 35">
+            <a:extLst>
+              <a:ext uri="{FF2B5EF4-FFF2-40B4-BE49-F238E27FC236}">
+                <a16:creationId xmlns:a16="http://schemas.microsoft.com/office/drawing/2014/main" id="{70B6753E-8B77-5CE8-640E-B3C72ADF9BFA}"/>
+              </a:ext>
+            </a:extLst>
+          </p:cNvPr>
+          <p:cNvSpPr txBox="1"/>
+          <p:nvPr/>
+        </p:nvSpPr>
+        <p:spPr>
+          <a:xfrm>
+            <a:off x="1556965" y="8726481"/>
+            <a:ext cx="600212" cy="246221"/>
+          </a:xfrm>
+          <a:prstGeom prst="rect">
+            <a:avLst/>
+          </a:prstGeom>
+          <a:noFill/>
+        </p:spPr>
+        <p:txBody>
+          <a:bodyPr wrap="square" rtlCol="0">
+            <a:spAutoFit/>
+          </a:bodyPr>
+          <a:lstStyle/>
+          <a:p>
+            <a:r>
+              <a:rPr lang="en-GB" sz="1000" dirty="0"/>
+              <a:t>S</a:t>
+            </a:r>
+            <a:r>
+              <a:rPr lang="en-FR" sz="1000" dirty="0"/>
+              <a:t>&amp;P500</a:t>
+            </a:r>
+          </a:p>
+        </p:txBody>
+      </p:sp>
+      <p:sp>
+        <p:nvSpPr>
+          <p:cNvPr id="37" name="TextBox 36">
+            <a:extLst>
+              <a:ext uri="{FF2B5EF4-FFF2-40B4-BE49-F238E27FC236}">
+                <a16:creationId xmlns:a16="http://schemas.microsoft.com/office/drawing/2014/main" id="{E6478BD1-FE65-E4AA-6124-C29EEB411400}"/>
+              </a:ext>
+            </a:extLst>
+          </p:cNvPr>
+          <p:cNvSpPr txBox="1"/>
+          <p:nvPr/>
+        </p:nvSpPr>
+        <p:spPr>
+          <a:xfrm>
+            <a:off x="0" y="9382145"/>
+            <a:ext cx="3431058" cy="246221"/>
+          </a:xfrm>
+          <a:prstGeom prst="rect">
+            <a:avLst/>
+          </a:prstGeom>
+          <a:noFill/>
+        </p:spPr>
+        <p:txBody>
+          <a:bodyPr wrap="square">
+            <a:spAutoFit/>
+          </a:bodyPr>
+          <a:lstStyle/>
+          <a:p>
+            <a:pPr algn="just"/>
+            <a:r>
+              <a:rPr lang="en-GB" sz="1000" dirty="0"/>
+              <a:t>This was motivation to launch Scientific Beta</a:t>
+            </a:r>
+          </a:p>
+        </p:txBody>
+      </p:sp>
+      <p:pic>
+        <p:nvPicPr>
+          <p:cNvPr id="39" name="Picture 38">
+            <a:extLst>
+              <a:ext uri="{FF2B5EF4-FFF2-40B4-BE49-F238E27FC236}">
+                <a16:creationId xmlns:a16="http://schemas.microsoft.com/office/drawing/2014/main" id="{C4ED0F8D-ADB0-51E3-065F-1DCE5E6CF687}"/>
+              </a:ext>
+            </a:extLst>
+          </p:cNvPr>
+          <p:cNvPicPr>
+            <a:picLocks noChangeAspect="1"/>
+          </p:cNvPicPr>
+          <p:nvPr/>
+        </p:nvPicPr>
+        <p:blipFill>
+          <a:blip r:embed="rId4"/>
+          <a:stretch>
+            <a:fillRect/>
+          </a:stretch>
+        </p:blipFill>
+        <p:spPr>
+          <a:xfrm>
+            <a:off x="3659170" y="302299"/>
+            <a:ext cx="1101516" cy="667309"/>
+          </a:xfrm>
+          <a:prstGeom prst="rect">
+            <a:avLst/>
+          </a:prstGeom>
+        </p:spPr>
+      </p:pic>
+      <p:sp>
+        <p:nvSpPr>
+          <p:cNvPr id="41" name="TextBox 40">
+            <a:extLst>
+              <a:ext uri="{FF2B5EF4-FFF2-40B4-BE49-F238E27FC236}">
+                <a16:creationId xmlns:a16="http://schemas.microsoft.com/office/drawing/2014/main" id="{9E8010F0-5DAF-9018-ABF5-7F50B9D599FC}"/>
+              </a:ext>
+            </a:extLst>
+          </p:cNvPr>
+          <p:cNvSpPr txBox="1"/>
+          <p:nvPr/>
+        </p:nvSpPr>
+        <p:spPr>
+          <a:xfrm>
+            <a:off x="4760686" y="276620"/>
+            <a:ext cx="2146151" cy="707886"/>
+          </a:xfrm>
+          <a:prstGeom prst="rect">
+            <a:avLst/>
+          </a:prstGeom>
+          <a:noFill/>
+        </p:spPr>
+        <p:txBody>
+          <a:bodyPr wrap="square">
+            <a:spAutoFit/>
+          </a:bodyPr>
+          <a:lstStyle/>
+          <a:p>
+            <a:r>
+              <a:rPr lang="en-US" sz="1000" dirty="0"/>
+              <a:t>Measure of being well-diversified is ENC. W=1 =&gt; ENC = 1. The most concentrated portfolio. If w1=</a:t>
+            </a:r>
+            <a:r>
+              <a:rPr lang="en-US" sz="1000" dirty="0" err="1"/>
+              <a:t>wn</a:t>
+            </a:r>
+            <a:r>
+              <a:rPr lang="en-US" sz="1000" dirty="0"/>
+              <a:t>=1/N =&gt; ENC = N</a:t>
+            </a:r>
+            <a:endParaRPr lang="en-FR" sz="1000" dirty="0"/>
+          </a:p>
+        </p:txBody>
+      </p:sp>
+      <p:sp>
+        <p:nvSpPr>
+          <p:cNvPr id="42" name="TextBox 41">
+            <a:extLst>
+              <a:ext uri="{FF2B5EF4-FFF2-40B4-BE49-F238E27FC236}">
+                <a16:creationId xmlns:a16="http://schemas.microsoft.com/office/drawing/2014/main" id="{2D594671-8C0A-9959-F111-F685F749662E}"/>
+              </a:ext>
+            </a:extLst>
+          </p:cNvPr>
+          <p:cNvSpPr txBox="1"/>
+          <p:nvPr/>
+        </p:nvSpPr>
+        <p:spPr>
+          <a:xfrm>
+            <a:off x="3525008" y="1032951"/>
+            <a:ext cx="3209615" cy="553998"/>
+          </a:xfrm>
+          <a:prstGeom prst="rect">
+            <a:avLst/>
+          </a:prstGeom>
+          <a:noFill/>
+        </p:spPr>
+        <p:txBody>
+          <a:bodyPr wrap="square">
+            <a:spAutoFit/>
+          </a:bodyPr>
+          <a:lstStyle/>
+          <a:p>
+            <a:pPr algn="just"/>
+            <a:r>
+              <a:rPr lang="en-US" sz="1000" dirty="0"/>
+              <a:t>The problem with S&amp;P500 is that it is concentrated.</a:t>
+            </a:r>
+          </a:p>
+          <a:p>
+            <a:pPr algn="just"/>
+            <a:r>
+              <a:rPr lang="en-US" sz="1000" dirty="0"/>
+              <a:t>Random selection also gives better results than S&amp;P500 (because this is 1/N on average) </a:t>
+            </a:r>
+          </a:p>
+        </p:txBody>
+      </p:sp>
+      <p:sp>
+        <p:nvSpPr>
+          <p:cNvPr id="43" name="TextBox 42">
+            <a:extLst>
+              <a:ext uri="{FF2B5EF4-FFF2-40B4-BE49-F238E27FC236}">
+                <a16:creationId xmlns:a16="http://schemas.microsoft.com/office/drawing/2014/main" id="{B7071764-C946-3285-6AE7-EFB5BFBA2877}"/>
+              </a:ext>
+            </a:extLst>
+          </p:cNvPr>
+          <p:cNvSpPr txBox="1"/>
+          <p:nvPr/>
+        </p:nvSpPr>
+        <p:spPr>
+          <a:xfrm>
+            <a:off x="3429002" y="27404"/>
+            <a:ext cx="3428998" cy="430887"/>
+          </a:xfrm>
+          <a:prstGeom prst="rect">
+            <a:avLst/>
+          </a:prstGeom>
+          <a:noFill/>
+        </p:spPr>
+        <p:txBody>
+          <a:bodyPr wrap="square" rtlCol="0">
+            <a:spAutoFit/>
+          </a:bodyPr>
+          <a:lstStyle/>
+          <a:p>
+            <a:pPr algn="just"/>
+            <a:r>
+              <a:rPr lang="en-US" sz="1200" b="1" dirty="0">
+                <a:solidFill>
+                  <a:srgbClr val="002060"/>
+                </a:solidFill>
+                <a:latin typeface="Dcr10"/>
+              </a:rPr>
+              <a:t>Concentration</a:t>
+            </a:r>
+            <a:endParaRPr lang="en-US" sz="1000" dirty="0"/>
+          </a:p>
+          <a:p>
+            <a:pPr algn="just"/>
+            <a:endParaRPr lang="en-US" sz="1000" dirty="0"/>
+          </a:p>
+        </p:txBody>
+      </p:sp>
+      <p:sp>
+        <p:nvSpPr>
+          <p:cNvPr id="44" name="TextBox 43">
+            <a:extLst>
+              <a:ext uri="{FF2B5EF4-FFF2-40B4-BE49-F238E27FC236}">
+                <a16:creationId xmlns:a16="http://schemas.microsoft.com/office/drawing/2014/main" id="{0C0F73E4-FDCB-3A57-8879-32DB4CED47C4}"/>
+              </a:ext>
+            </a:extLst>
+          </p:cNvPr>
+          <p:cNvSpPr txBox="1"/>
+          <p:nvPr/>
+        </p:nvSpPr>
+        <p:spPr>
+          <a:xfrm>
+            <a:off x="3429002" y="1573038"/>
+            <a:ext cx="3428998" cy="430887"/>
+          </a:xfrm>
+          <a:prstGeom prst="rect">
+            <a:avLst/>
+          </a:prstGeom>
+          <a:noFill/>
+        </p:spPr>
+        <p:txBody>
+          <a:bodyPr wrap="square" rtlCol="0">
+            <a:spAutoFit/>
+          </a:bodyPr>
+          <a:lstStyle/>
+          <a:p>
+            <a:pPr algn="just"/>
+            <a:r>
+              <a:rPr lang="en-US" sz="1200" b="1" dirty="0">
+                <a:solidFill>
+                  <a:srgbClr val="002060"/>
+                </a:solidFill>
+                <a:latin typeface="Dcr10"/>
+              </a:rPr>
+              <a:t>SR maximization</a:t>
+            </a:r>
+            <a:endParaRPr lang="en-US" sz="1000" dirty="0"/>
+          </a:p>
+          <a:p>
+            <a:pPr algn="just"/>
+            <a:endParaRPr lang="en-US" sz="1000" dirty="0"/>
+          </a:p>
+        </p:txBody>
+      </p:sp>
+      <p:sp>
+        <p:nvSpPr>
+          <p:cNvPr id="45" name="TextBox 44">
+            <a:extLst>
+              <a:ext uri="{FF2B5EF4-FFF2-40B4-BE49-F238E27FC236}">
+                <a16:creationId xmlns:a16="http://schemas.microsoft.com/office/drawing/2014/main" id="{28659FA7-5AAB-1E01-480B-22037DD00767}"/>
+              </a:ext>
+            </a:extLst>
+          </p:cNvPr>
+          <p:cNvSpPr txBox="1"/>
+          <p:nvPr/>
+        </p:nvSpPr>
+        <p:spPr>
+          <a:xfrm>
+            <a:off x="3428999" y="1811993"/>
+            <a:ext cx="3305620" cy="1477328"/>
+          </a:xfrm>
+          <a:prstGeom prst="rect">
+            <a:avLst/>
+          </a:prstGeom>
+          <a:noFill/>
+        </p:spPr>
+        <p:txBody>
+          <a:bodyPr wrap="square">
+            <a:spAutoFit/>
+          </a:bodyPr>
+          <a:lstStyle/>
+          <a:p>
+            <a:pPr algn="just"/>
+            <a:r>
+              <a:rPr lang="en-US" sz="1000" dirty="0"/>
+              <a:t>We cannot do Markowitz, because cannot normally estimate expected returns (confidence intervals are too wide) and because too many constituents =&gt; next things was. Fund that was using GMV got a lot of money. But the problem of GMV does not outperform 1/N. Because of  curse of dimensionality. Did GMV deliver out-of-sample low vol? Yes. So, actually it was a move in the right direction. But it did not delver Sharpe. If your risk is GMV-like then ok, hold it.</a:t>
+            </a:r>
+          </a:p>
+        </p:txBody>
+      </p:sp>
+      <p:sp>
+        <p:nvSpPr>
+          <p:cNvPr id="2" name="TextBox 1">
+            <a:extLst>
+              <a:ext uri="{FF2B5EF4-FFF2-40B4-BE49-F238E27FC236}">
+                <a16:creationId xmlns:a16="http://schemas.microsoft.com/office/drawing/2014/main" id="{028F30A7-374D-FC4B-EE7B-8B06AAD328E9}"/>
+              </a:ext>
+            </a:extLst>
+          </p:cNvPr>
+          <p:cNvSpPr txBox="1"/>
+          <p:nvPr/>
+        </p:nvSpPr>
+        <p:spPr>
+          <a:xfrm>
+            <a:off x="3426944" y="3289321"/>
+            <a:ext cx="3428998" cy="430887"/>
+          </a:xfrm>
+          <a:prstGeom prst="rect">
+            <a:avLst/>
+          </a:prstGeom>
+          <a:noFill/>
+        </p:spPr>
+        <p:txBody>
+          <a:bodyPr wrap="square" rtlCol="0">
+            <a:spAutoFit/>
+          </a:bodyPr>
+          <a:lstStyle/>
+          <a:p>
+            <a:pPr algn="just"/>
+            <a:r>
+              <a:rPr lang="en-US" sz="1200" b="1" dirty="0">
+                <a:solidFill>
+                  <a:srgbClr val="002060"/>
+                </a:solidFill>
+                <a:latin typeface="Dcr10"/>
+              </a:rPr>
+              <a:t>Max decorrelation portfolio</a:t>
+            </a:r>
+            <a:endParaRPr lang="en-US" sz="1000" dirty="0"/>
+          </a:p>
+          <a:p>
+            <a:pPr algn="just"/>
+            <a:endParaRPr lang="en-US" sz="1000" dirty="0"/>
+          </a:p>
+        </p:txBody>
+      </p:sp>
+      <p:sp>
+        <p:nvSpPr>
+          <p:cNvPr id="4" name="TextBox 3">
+            <a:extLst>
+              <a:ext uri="{FF2B5EF4-FFF2-40B4-BE49-F238E27FC236}">
+                <a16:creationId xmlns:a16="http://schemas.microsoft.com/office/drawing/2014/main" id="{77941E6D-BFA8-E846-8BFE-B55D33BEFB9C}"/>
+              </a:ext>
+            </a:extLst>
+          </p:cNvPr>
+          <p:cNvSpPr txBox="1"/>
+          <p:nvPr/>
+        </p:nvSpPr>
+        <p:spPr>
+          <a:xfrm>
+            <a:off x="3426941" y="3528276"/>
+            <a:ext cx="3305620" cy="553998"/>
+          </a:xfrm>
+          <a:prstGeom prst="rect">
+            <a:avLst/>
+          </a:prstGeom>
+          <a:noFill/>
+        </p:spPr>
+        <p:txBody>
+          <a:bodyPr wrap="square">
+            <a:spAutoFit/>
+          </a:bodyPr>
+          <a:lstStyle/>
+          <a:p>
+            <a:pPr algn="just"/>
+            <a:r>
+              <a:rPr lang="en-US" sz="1000" dirty="0"/>
+              <a:t>GMV does not use correlation component enough. There is a simple scheme to use with success: do GMV while forcing stocks to have the same volatility. This </a:t>
+            </a:r>
+          </a:p>
+        </p:txBody>
+      </p:sp>
+      <p:sp>
+        <p:nvSpPr>
+          <p:cNvPr id="5" name="TextBox 4">
+            <a:extLst>
+              <a:ext uri="{FF2B5EF4-FFF2-40B4-BE49-F238E27FC236}">
+                <a16:creationId xmlns:a16="http://schemas.microsoft.com/office/drawing/2014/main" id="{70DDA556-61DC-5EDB-67A3-5D88407D4B04}"/>
+              </a:ext>
+            </a:extLst>
+          </p:cNvPr>
+          <p:cNvSpPr txBox="1"/>
+          <p:nvPr/>
+        </p:nvSpPr>
+        <p:spPr>
+          <a:xfrm>
+            <a:off x="3429002" y="4035411"/>
+            <a:ext cx="3428998" cy="430887"/>
+          </a:xfrm>
+          <a:prstGeom prst="rect">
+            <a:avLst/>
+          </a:prstGeom>
+          <a:noFill/>
+        </p:spPr>
+        <p:txBody>
+          <a:bodyPr wrap="square" rtlCol="0">
+            <a:spAutoFit/>
+          </a:bodyPr>
+          <a:lstStyle/>
+          <a:p>
+            <a:pPr algn="just"/>
+            <a:r>
+              <a:rPr lang="en-US" sz="1200" b="1" dirty="0">
+                <a:solidFill>
+                  <a:srgbClr val="002060"/>
+                </a:solidFill>
+                <a:latin typeface="Dcr10"/>
+              </a:rPr>
+              <a:t>Max diversification portfolio</a:t>
+            </a:r>
+            <a:endParaRPr lang="en-US" sz="1000" dirty="0"/>
+          </a:p>
+          <a:p>
+            <a:pPr algn="just"/>
+            <a:endParaRPr lang="en-US" sz="1000" dirty="0"/>
+          </a:p>
+        </p:txBody>
+      </p:sp>
+      <p:sp>
+        <p:nvSpPr>
+          <p:cNvPr id="7" name="TextBox 6">
+            <a:extLst>
+              <a:ext uri="{FF2B5EF4-FFF2-40B4-BE49-F238E27FC236}">
+                <a16:creationId xmlns:a16="http://schemas.microsoft.com/office/drawing/2014/main" id="{4B1BF54C-8470-1E3C-3E2C-15D84C4E9A40}"/>
+              </a:ext>
+            </a:extLst>
+          </p:cNvPr>
+          <p:cNvSpPr txBox="1"/>
+          <p:nvPr/>
+        </p:nvSpPr>
+        <p:spPr>
+          <a:xfrm>
+            <a:off x="3428999" y="4274366"/>
+            <a:ext cx="3305620" cy="400110"/>
+          </a:xfrm>
+          <a:prstGeom prst="rect">
+            <a:avLst/>
+          </a:prstGeom>
+          <a:noFill/>
+        </p:spPr>
+        <p:txBody>
+          <a:bodyPr wrap="square">
+            <a:spAutoFit/>
+          </a:bodyPr>
+          <a:lstStyle/>
+          <a:p>
+            <a:pPr algn="just"/>
+            <a:r>
+              <a:rPr lang="en-US" sz="1000" dirty="0"/>
+              <a:t>Launched by creator of </a:t>
+            </a:r>
+            <a:r>
+              <a:rPr lang="en-US" sz="1000" dirty="0" err="1"/>
+              <a:t>Tobam</a:t>
+            </a:r>
+            <a:r>
+              <a:rPr lang="en-US" sz="1000" dirty="0"/>
+              <a:t> company</a:t>
+            </a:r>
+          </a:p>
+          <a:p>
+            <a:pPr algn="just"/>
+            <a:r>
+              <a:rPr lang="en-US" sz="1000" dirty="0"/>
+              <a:t>They were doing max diversification portfolio:</a:t>
+            </a:r>
+          </a:p>
+        </p:txBody>
+      </p:sp>
+      <p:pic>
+        <p:nvPicPr>
+          <p:cNvPr id="9" name="Picture 8">
+            <a:extLst>
+              <a:ext uri="{FF2B5EF4-FFF2-40B4-BE49-F238E27FC236}">
+                <a16:creationId xmlns:a16="http://schemas.microsoft.com/office/drawing/2014/main" id="{3E7BEAC4-BDB6-F3D9-940E-7B8C88ED9789}"/>
+              </a:ext>
+            </a:extLst>
+          </p:cNvPr>
+          <p:cNvPicPr>
+            <a:picLocks noChangeAspect="1"/>
+          </p:cNvPicPr>
+          <p:nvPr/>
+        </p:nvPicPr>
+        <p:blipFill>
+          <a:blip r:embed="rId5"/>
+          <a:stretch>
+            <a:fillRect/>
+          </a:stretch>
+        </p:blipFill>
+        <p:spPr>
+          <a:xfrm>
+            <a:off x="3952629" y="4643022"/>
+            <a:ext cx="2062410" cy="782852"/>
+          </a:xfrm>
+          <a:prstGeom prst="rect">
+            <a:avLst/>
+          </a:prstGeom>
+        </p:spPr>
+      </p:pic>
+      <p:sp>
+        <p:nvSpPr>
+          <p:cNvPr id="10" name="TextBox 9">
+            <a:extLst>
+              <a:ext uri="{FF2B5EF4-FFF2-40B4-BE49-F238E27FC236}">
+                <a16:creationId xmlns:a16="http://schemas.microsoft.com/office/drawing/2014/main" id="{9B8EEB35-5CA6-6DDD-5A9E-03B085ABF4A1}"/>
+              </a:ext>
+            </a:extLst>
+          </p:cNvPr>
+          <p:cNvSpPr txBox="1"/>
+          <p:nvPr/>
+        </p:nvSpPr>
+        <p:spPr>
+          <a:xfrm>
+            <a:off x="3426941" y="5313453"/>
+            <a:ext cx="3305620" cy="553998"/>
+          </a:xfrm>
+          <a:prstGeom prst="rect">
+            <a:avLst/>
+          </a:prstGeom>
+          <a:noFill/>
+        </p:spPr>
+        <p:txBody>
+          <a:bodyPr wrap="square">
+            <a:spAutoFit/>
+          </a:bodyPr>
+          <a:lstStyle/>
+          <a:p>
+            <a:pPr algn="just"/>
+            <a:r>
+              <a:rPr lang="en-US" sz="1000" dirty="0"/>
+              <a:t>Actually it is not max div. portfolio, max ENC portfolio would be max diversified portfolio. This is more of the most balanced portfolio. Really max div. portfolio is MSR.</a:t>
+            </a:r>
+          </a:p>
+        </p:txBody>
+      </p:sp>
+      <p:sp>
+        <p:nvSpPr>
+          <p:cNvPr id="11" name="TextBox 10">
+            <a:extLst>
+              <a:ext uri="{FF2B5EF4-FFF2-40B4-BE49-F238E27FC236}">
+                <a16:creationId xmlns:a16="http://schemas.microsoft.com/office/drawing/2014/main" id="{CD7525B6-7EED-5320-04BD-74B0DCEEF1E0}"/>
+              </a:ext>
+            </a:extLst>
+          </p:cNvPr>
+          <p:cNvSpPr txBox="1"/>
+          <p:nvPr/>
+        </p:nvSpPr>
+        <p:spPr>
+          <a:xfrm>
+            <a:off x="3426941" y="6083802"/>
+            <a:ext cx="3305620" cy="4555093"/>
+          </a:xfrm>
+          <a:prstGeom prst="rect">
+            <a:avLst/>
+          </a:prstGeom>
+          <a:noFill/>
+        </p:spPr>
+        <p:txBody>
+          <a:bodyPr wrap="square">
+            <a:spAutoFit/>
+          </a:bodyPr>
+          <a:lstStyle/>
+          <a:p>
+            <a:pPr algn="just"/>
+            <a:r>
+              <a:rPr lang="en-US" sz="1000" dirty="0"/>
+              <a:t>We do not live in CAPM world, we believe more in multi-factor.</a:t>
+            </a:r>
+          </a:p>
+          <a:p>
+            <a:pPr algn="just"/>
+            <a:endParaRPr lang="en-US" sz="1000" dirty="0"/>
+          </a:p>
+          <a:p>
+            <a:pPr algn="just"/>
+            <a:r>
+              <a:rPr lang="en-US" sz="1000" dirty="0">
+                <a:highlight>
+                  <a:srgbClr val="FFFF00"/>
+                </a:highlight>
+              </a:rPr>
+              <a:t>No, we do not: come to </a:t>
+            </a:r>
+            <a:r>
+              <a:rPr lang="en-US" sz="1000" dirty="0" err="1">
+                <a:highlight>
+                  <a:srgbClr val="FFFF00"/>
+                </a:highlight>
+              </a:rPr>
+              <a:t>lionel</a:t>
+            </a:r>
+            <a:r>
+              <a:rPr lang="en-US" sz="1000" dirty="0">
+                <a:highlight>
+                  <a:srgbClr val="FFFF00"/>
+                </a:highlight>
+              </a:rPr>
+              <a:t> and talk about </a:t>
+            </a:r>
+            <a:r>
+              <a:rPr lang="en-US" sz="1000" dirty="0" err="1">
+                <a:highlight>
+                  <a:srgbClr val="FFFF00"/>
+                </a:highlight>
+              </a:rPr>
+              <a:t>raman’s</a:t>
+            </a:r>
+            <a:r>
+              <a:rPr lang="en-US" sz="1000" dirty="0">
+                <a:highlight>
+                  <a:srgbClr val="FFFF00"/>
+                </a:highlight>
+              </a:rPr>
+              <a:t> 2022 paper</a:t>
+            </a:r>
+          </a:p>
+          <a:p>
+            <a:pPr algn="just"/>
+            <a:endParaRPr lang="en-US" sz="1000" dirty="0"/>
+          </a:p>
+          <a:p>
+            <a:pPr algn="just"/>
+            <a:r>
+              <a:rPr lang="en-US" sz="1000" dirty="0"/>
+              <a:t>Whatever you do you end up holding some factors. Don’t think that if you invest you do not hold some factors, everyone is exposed to some of them willingly or not. So. You have to be aware of knowing what you are exposed to. </a:t>
+            </a:r>
+          </a:p>
+          <a:p>
+            <a:pPr algn="just"/>
+            <a:endParaRPr lang="en-US" sz="1000" dirty="0"/>
+          </a:p>
+          <a:p>
+            <a:pPr algn="just"/>
+            <a:r>
+              <a:rPr lang="en-US" sz="1000" dirty="0"/>
+              <a:t>The most agnostic prior is “all equal”. This is a fine </a:t>
+            </a:r>
+            <a:r>
+              <a:rPr lang="en-US" sz="1000" dirty="0" err="1"/>
+              <a:t>forporto</a:t>
+            </a:r>
+            <a:r>
+              <a:rPr lang="en-US" sz="1000" dirty="0"/>
+              <a:t>. It is not max SR portfolio. This can be a good enough portfolio to come up with strategic or tactical lambdas (factors). But I am in a business of </a:t>
+            </a:r>
+            <a:r>
+              <a:rPr lang="en-US" sz="1000" dirty="0" err="1"/>
+              <a:t>custructing</a:t>
+            </a:r>
+            <a:r>
+              <a:rPr lang="en-US" sz="1000" dirty="0"/>
+              <a:t> a good benchmark. Hence, maybe factors have fine SR.</a:t>
+            </a:r>
+          </a:p>
+          <a:p>
+            <a:pPr algn="just"/>
+            <a:endParaRPr lang="en-US" sz="1000" dirty="0"/>
+          </a:p>
+          <a:p>
+            <a:pPr algn="just"/>
+            <a:r>
+              <a:rPr lang="en-US" sz="1000" dirty="0"/>
+              <a:t>From 50 years of returns values does better than … =&gt; let me use it. On average over next 50 years that can hold. </a:t>
+            </a:r>
+            <a:r>
+              <a:rPr lang="en-US" sz="1000" dirty="0">
+                <a:highlight>
+                  <a:srgbClr val="FFFF00"/>
+                </a:highlight>
+              </a:rPr>
+              <a:t>For 20 years people are talking only about </a:t>
+            </a:r>
+            <a:r>
+              <a:rPr lang="en-US" sz="1000" dirty="0" err="1">
+                <a:highlight>
+                  <a:srgbClr val="FFFF00"/>
+                </a:highlight>
+              </a:rPr>
+              <a:t>Fama</a:t>
+            </a:r>
+            <a:r>
+              <a:rPr lang="en-US" sz="1000" dirty="0">
+                <a:highlight>
+                  <a:srgbClr val="FFFF00"/>
+                </a:highlight>
+              </a:rPr>
+              <a:t> French, and this is why I moved to quantum physics.</a:t>
+            </a:r>
+          </a:p>
+          <a:p>
+            <a:pPr algn="just"/>
+            <a:endParaRPr lang="en-US" sz="1000" dirty="0">
+              <a:highlight>
+                <a:srgbClr val="FFFF00"/>
+              </a:highlight>
+            </a:endParaRPr>
+          </a:p>
+          <a:p>
+            <a:pPr algn="just"/>
+            <a:r>
+              <a:rPr lang="en-US" sz="1000" dirty="0"/>
+              <a:t>EW (1/N) can be improved by going in terms of risk. Doing risk parity.</a:t>
+            </a:r>
+          </a:p>
+          <a:p>
+            <a:pPr algn="just"/>
+            <a:endParaRPr lang="en-US" sz="1000" dirty="0"/>
+          </a:p>
+          <a:p>
+            <a:pPr algn="just"/>
+            <a:endParaRPr lang="en-US" sz="1000" dirty="0"/>
+          </a:p>
+          <a:p>
+            <a:pPr algn="just"/>
+            <a:r>
+              <a:rPr lang="en-US" sz="1000" dirty="0" err="1">
+                <a:highlight>
+                  <a:srgbClr val="FFFF00"/>
+                </a:highlight>
+              </a:rPr>
+              <a:t>Cmon</a:t>
+            </a:r>
+            <a:r>
+              <a:rPr lang="en-US" sz="1000" dirty="0">
+                <a:highlight>
+                  <a:srgbClr val="FFFF00"/>
+                </a:highlight>
+              </a:rPr>
+              <a:t> people, design program so that you know what you give to students. You need to have a plan if you want the program to follow a plan.</a:t>
+            </a:r>
           </a:p>
         </p:txBody>
       </p:sp>
@@ -10119,6 +12144,796 @@
 </file>
 
 <file path=ppt/slides/slide6.xml><?xml version="1.0" encoding="utf-8"?>
+<p:sld xmlns:a="http://schemas.openxmlformats.org/drawingml/2006/main" xmlns:r="http://schemas.openxmlformats.org/officeDocument/2006/relationships" xmlns:p="http://schemas.openxmlformats.org/presentationml/2006/main">
+  <p:cSld>
+    <p:spTree>
+      <p:nvGrpSpPr>
+        <p:cNvPr id="1" name="">
+          <a:extLst>
+            <a:ext uri="{FF2B5EF4-FFF2-40B4-BE49-F238E27FC236}">
+              <a16:creationId xmlns:a16="http://schemas.microsoft.com/office/drawing/2014/main" id="{5B2B3252-724D-49C6-564A-B2CE67228E29}"/>
+            </a:ext>
+          </a:extLst>
+        </p:cNvPr>
+        <p:cNvGrpSpPr/>
+        <p:nvPr/>
+      </p:nvGrpSpPr>
+      <p:grpSpPr>
+        <a:xfrm>
+          <a:off x="0" y="0"/>
+          <a:ext cx="0" cy="0"/>
+          <a:chOff x="0" y="0"/>
+          <a:chExt cx="0" cy="0"/>
+        </a:xfrm>
+      </p:grpSpPr>
+      <p:sp>
+        <p:nvSpPr>
+          <p:cNvPr id="6" name="TextBox 5">
+            <a:extLst>
+              <a:ext uri="{FF2B5EF4-FFF2-40B4-BE49-F238E27FC236}">
+                <a16:creationId xmlns:a16="http://schemas.microsoft.com/office/drawing/2014/main" id="{F1A42889-5A4A-A0AB-AB2F-E0D95B52EFCF}"/>
+              </a:ext>
+            </a:extLst>
+          </p:cNvPr>
+          <p:cNvSpPr txBox="1"/>
+          <p:nvPr/>
+        </p:nvSpPr>
+        <p:spPr>
+          <a:xfrm>
+            <a:off x="1" y="0"/>
+            <a:ext cx="3428998" cy="738664"/>
+          </a:xfrm>
+          <a:prstGeom prst="rect">
+            <a:avLst/>
+          </a:prstGeom>
+          <a:noFill/>
+        </p:spPr>
+        <p:txBody>
+          <a:bodyPr wrap="square" rtlCol="0">
+            <a:spAutoFit/>
+          </a:bodyPr>
+          <a:lstStyle/>
+          <a:p>
+            <a:pPr algn="just"/>
+            <a:r>
+              <a:rPr lang="en-GB" sz="1200" b="1" dirty="0">
+                <a:solidFill>
+                  <a:srgbClr val="002060"/>
+                </a:solidFill>
+                <a:latin typeface="Dcr10"/>
+              </a:rPr>
+              <a:t>Other problems</a:t>
+            </a:r>
+          </a:p>
+          <a:p>
+            <a:pPr algn="just"/>
+            <a:r>
+              <a:rPr lang="en-US" sz="1000" dirty="0"/>
+              <a:t>Can you do </a:t>
+            </a:r>
+            <a:r>
+              <a:rPr lang="en-US" sz="1000" dirty="0" err="1"/>
+              <a:t>smth</a:t>
+            </a:r>
+            <a:r>
+              <a:rPr lang="en-US" sz="1000" dirty="0"/>
+              <a:t> like </a:t>
+            </a:r>
+            <a:r>
+              <a:rPr lang="en-US" sz="1000" dirty="0" err="1"/>
+              <a:t>equaly</a:t>
+            </a:r>
+            <a:r>
+              <a:rPr lang="en-US" sz="1000" dirty="0"/>
+              <a:t> weighted by decrease carbon footprint?</a:t>
+            </a:r>
+          </a:p>
+          <a:p>
+            <a:pPr algn="just"/>
+            <a:r>
+              <a:rPr lang="en-US" sz="1000" dirty="0"/>
+              <a:t>Can you do equally weighted but with low TE from …?</a:t>
+            </a:r>
+          </a:p>
+        </p:txBody>
+      </p:sp>
+      <p:sp>
+        <p:nvSpPr>
+          <p:cNvPr id="8" name="TextBox 7">
+            <a:extLst>
+              <a:ext uri="{FF2B5EF4-FFF2-40B4-BE49-F238E27FC236}">
+                <a16:creationId xmlns:a16="http://schemas.microsoft.com/office/drawing/2014/main" id="{042352F5-F684-3ECA-EC93-205F71CC0C05}"/>
+              </a:ext>
+            </a:extLst>
+          </p:cNvPr>
+          <p:cNvSpPr txBox="1"/>
+          <p:nvPr/>
+        </p:nvSpPr>
+        <p:spPr>
+          <a:xfrm>
+            <a:off x="1" y="789007"/>
+            <a:ext cx="3428998" cy="9510296"/>
+          </a:xfrm>
+          <a:prstGeom prst="rect">
+            <a:avLst/>
+          </a:prstGeom>
+          <a:noFill/>
+        </p:spPr>
+        <p:txBody>
+          <a:bodyPr wrap="square" rtlCol="0">
+            <a:spAutoFit/>
+          </a:bodyPr>
+          <a:lstStyle/>
+          <a:p>
+            <a:pPr algn="just"/>
+            <a:r>
+              <a:rPr lang="en-GB" sz="1200" b="1" dirty="0">
+                <a:solidFill>
+                  <a:srgbClr val="002060"/>
+                </a:solidFill>
+                <a:latin typeface="Dcr10"/>
+              </a:rPr>
+              <a:t>Diversification of rewarded risks</a:t>
+            </a:r>
+          </a:p>
+          <a:p>
+            <a:pPr algn="just"/>
+            <a:r>
+              <a:rPr lang="en-US" sz="1000" dirty="0"/>
+              <a:t>It turns out that cap-weighted can overweight stocks that have wrong factor exposure.</a:t>
+            </a:r>
+          </a:p>
+          <a:p>
+            <a:pPr algn="just"/>
+            <a:endParaRPr lang="en-US" sz="1000" dirty="0"/>
+          </a:p>
+          <a:p>
+            <a:pPr algn="just"/>
+            <a:r>
+              <a:rPr lang="en-US" sz="1000" dirty="0"/>
+              <a:t>For example, Cap weighted is tilted to large cap by construction. You will have negative beta for cap-weighted on small cap. When you are holding cap-weighted you hold a wrong portfolio. You are paying some premia so </a:t>
+            </a:r>
+            <a:r>
+              <a:rPr lang="en-US" sz="1000" dirty="0" err="1"/>
+              <a:t>smb</a:t>
+            </a:r>
+            <a:r>
+              <a:rPr lang="en-US" sz="1000" dirty="0"/>
+              <a:t>. Maybe this is ok for some, because they are too big. This premia comes from safety. I don’t want to be stack in small-cap stocks.</a:t>
+            </a:r>
+          </a:p>
+          <a:p>
+            <a:pPr algn="just"/>
+            <a:endParaRPr lang="en-US" sz="1000" dirty="0"/>
+          </a:p>
+          <a:p>
+            <a:pPr algn="just"/>
+            <a:r>
+              <a:rPr lang="en-US" sz="1000" dirty="0"/>
+              <a:t>Some people say that EW has small cap bias. </a:t>
+            </a:r>
+          </a:p>
+          <a:p>
+            <a:pPr algn="just"/>
+            <a:endParaRPr lang="en-US" sz="1000" dirty="0"/>
+          </a:p>
+          <a:p>
+            <a:pPr algn="just"/>
+            <a:r>
+              <a:rPr lang="en-US" sz="1000" dirty="0"/>
+              <a:t>What about value premia? CW or EW have a bias towards it?</a:t>
+            </a:r>
+          </a:p>
+          <a:p>
+            <a:pPr algn="just"/>
+            <a:r>
+              <a:rPr lang="en-US" sz="1000" dirty="0"/>
+              <a:t>Negative exposure to value factor.</a:t>
+            </a:r>
+          </a:p>
+          <a:p>
+            <a:pPr algn="just"/>
+            <a:endParaRPr lang="en-US" sz="1000" dirty="0"/>
+          </a:p>
+          <a:p>
+            <a:pPr algn="just"/>
+            <a:r>
+              <a:rPr lang="en-US" sz="1000" b="1" dirty="0">
+                <a:solidFill>
+                  <a:srgbClr val="002060"/>
+                </a:solidFill>
+              </a:rPr>
+              <a:t>Cap weighted was bad, because it was missing several risk-premia. It holds risk that is negatively rewarded. It is not only 0 risk premia, but also pays risk premia.</a:t>
+            </a:r>
+          </a:p>
+          <a:p>
+            <a:pPr algn="just"/>
+            <a:endParaRPr lang="en-US" sz="1000" dirty="0"/>
+          </a:p>
+          <a:p>
+            <a:pPr algn="just"/>
+            <a:r>
+              <a:rPr lang="en-US" sz="1000" dirty="0"/>
+              <a:t>What scientific beta has been good at:</a:t>
+            </a:r>
+          </a:p>
+          <a:p>
+            <a:pPr algn="just"/>
+            <a:r>
+              <a:rPr lang="en-US" sz="1000" dirty="0"/>
+              <a:t>In 2005 everybody realized cap-weighted is bad. In 2010 smart-beta appeared (GMV, risk-parities, etc.)</a:t>
+            </a:r>
+          </a:p>
+          <a:p>
+            <a:pPr algn="just"/>
+            <a:endParaRPr lang="en-US" sz="1000" dirty="0"/>
+          </a:p>
+          <a:p>
+            <a:pPr algn="just"/>
+            <a:r>
+              <a:rPr lang="en-US" sz="1000" dirty="0"/>
+              <a:t>GMV and ERC tend to be safe portfolios and overweight global stocks. Their beta is 0.8, it is defensive portfolio. Should you be happy or not holding strategically with it? No, because I am harvesting 80% of risk premia. </a:t>
+            </a:r>
+          </a:p>
+          <a:p>
+            <a:pPr algn="just"/>
+            <a:endParaRPr lang="en-US" sz="1000" dirty="0"/>
+          </a:p>
+          <a:p>
+            <a:pPr algn="just"/>
+            <a:r>
+              <a:rPr lang="en-US" sz="1000" dirty="0"/>
+              <a:t>What you may want to do is doing GMV or ERC constrained to have beta 1.</a:t>
+            </a:r>
+          </a:p>
+          <a:p>
+            <a:pPr algn="just"/>
+            <a:endParaRPr lang="en-US" sz="1000" dirty="0"/>
+          </a:p>
+          <a:p>
+            <a:pPr algn="just"/>
+            <a:r>
+              <a:rPr lang="en-US" sz="1000" dirty="0"/>
+              <a:t>In 2008-2010 they were becoming frustrated, because people were not paying attention to factor exposures. For example, how about momentum? Cap-weighted has better exposure to MOM. In EW winners are sold, losers are bought. Scientific beta was among the first to say “ok, we are better now than cap-weighted. What about factor exposures?” Got message from MSCI ”these guys now complain about negative exposure to momentum. But do not worry, we MSCI have answer to everything. Particularly if you want momentum, just buy good old cap-weighted.” What is wrong about this statement? It is bad, because (</a:t>
+            </a:r>
+            <a:r>
+              <a:rPr lang="en-US" sz="1000" dirty="0" err="1"/>
+              <a:t>eujen</a:t>
+            </a:r>
+            <a:r>
+              <a:rPr lang="en-US" sz="1000" dirty="0"/>
+              <a:t> </a:t>
+            </a:r>
+            <a:r>
+              <a:rPr lang="en-US" sz="1000" dirty="0" err="1"/>
+              <a:t>fama</a:t>
+            </a:r>
+            <a:r>
+              <a:rPr lang="en-US" sz="1000" dirty="0"/>
+              <a:t> told it to us): diversify portfolio along the tilt that you choose. If you want to harvest risk premia, just choose it and hold diversified portfolios along that tilt. So, for momentum exposure you manually identify past winners and hold them, past losers you do not hold. Allocation to past winners should be diversified: harvest full premia by holding past winners &amp; holding smart beta like risk parity.</a:t>
+            </a:r>
+          </a:p>
+          <a:p>
+            <a:pPr algn="just"/>
+            <a:endParaRPr lang="en-US" sz="1000" dirty="0"/>
+          </a:p>
+          <a:p>
+            <a:pPr algn="just"/>
+            <a:r>
+              <a:rPr lang="en-US" sz="1000" dirty="0"/>
+              <a:t>Why we care about factor exposures and not sector exposures?</a:t>
+            </a:r>
+          </a:p>
+          <a:p>
+            <a:pPr algn="just"/>
+            <a:r>
+              <a:rPr lang="en-US" sz="1000" dirty="0"/>
+              <a:t>Because they come with risk premia.</a:t>
+            </a:r>
+          </a:p>
+          <a:p>
+            <a:pPr algn="just"/>
+            <a:endParaRPr lang="en-US" sz="1000" dirty="0"/>
+          </a:p>
+          <a:p>
+            <a:pPr algn="just"/>
+            <a:r>
+              <a:rPr lang="en-US" sz="1000" dirty="0"/>
+              <a:t>These </a:t>
+            </a:r>
+            <a:r>
+              <a:rPr lang="en-US" sz="1000" dirty="0" err="1"/>
+              <a:t>premias</a:t>
+            </a:r>
+            <a:r>
+              <a:rPr lang="en-US" sz="1000" dirty="0"/>
+              <a:t> exist because you can loose a lot of money.</a:t>
+            </a:r>
+          </a:p>
+          <a:p>
+            <a:pPr algn="just"/>
+            <a:endParaRPr lang="en-US" sz="1000" dirty="0"/>
+          </a:p>
+          <a:p>
+            <a:pPr algn="just"/>
+            <a:r>
+              <a:rPr lang="en-US" sz="1000" dirty="0"/>
+              <a:t>Stocks tend to go down at the worst possible time. But this is not the case for bonds.</a:t>
+            </a:r>
+          </a:p>
+          <a:p>
+            <a:pPr algn="just"/>
+            <a:endParaRPr lang="en-US" sz="1000" dirty="0"/>
+          </a:p>
+          <a:p>
+            <a:pPr algn="just"/>
+            <a:endParaRPr lang="en-US" sz="1000" dirty="0"/>
+          </a:p>
+        </p:txBody>
+      </p:sp>
+      <p:sp>
+        <p:nvSpPr>
+          <p:cNvPr id="12" name="TextBox 11">
+            <a:extLst>
+              <a:ext uri="{FF2B5EF4-FFF2-40B4-BE49-F238E27FC236}">
+                <a16:creationId xmlns:a16="http://schemas.microsoft.com/office/drawing/2014/main" id="{C953D08D-146A-90A4-0545-B008E53DDEF3}"/>
+              </a:ext>
+            </a:extLst>
+          </p:cNvPr>
+          <p:cNvSpPr txBox="1"/>
+          <p:nvPr/>
+        </p:nvSpPr>
+        <p:spPr>
+          <a:xfrm>
+            <a:off x="3429002" y="0"/>
+            <a:ext cx="3428998" cy="3046988"/>
+          </a:xfrm>
+          <a:prstGeom prst="rect">
+            <a:avLst/>
+          </a:prstGeom>
+          <a:noFill/>
+        </p:spPr>
+        <p:txBody>
+          <a:bodyPr wrap="square" rtlCol="0">
+            <a:spAutoFit/>
+          </a:bodyPr>
+          <a:lstStyle/>
+          <a:p>
+            <a:pPr algn="just"/>
+            <a:r>
+              <a:rPr lang="en-US" sz="1200" b="1" dirty="0">
+                <a:solidFill>
+                  <a:srgbClr val="002060"/>
+                </a:solidFill>
+                <a:latin typeface="Dcr10"/>
+              </a:rPr>
+              <a:t>Paper “diversifying the diversifiers”</a:t>
+            </a:r>
+            <a:endParaRPr lang="en-GB" sz="1200" b="1" dirty="0">
+              <a:solidFill>
+                <a:srgbClr val="002060"/>
+              </a:solidFill>
+              <a:latin typeface="Dcr10"/>
+            </a:endParaRPr>
+          </a:p>
+          <a:p>
+            <a:pPr algn="just"/>
+            <a:r>
+              <a:rPr lang="en-US" sz="1000" dirty="0"/>
+              <a:t>No strategy from those </a:t>
+            </a:r>
+            <a:r>
+              <a:rPr lang="en-US" sz="1000" dirty="0" err="1"/>
+              <a:t>iscussed</a:t>
+            </a:r>
+            <a:r>
+              <a:rPr lang="en-US" sz="1000" dirty="0"/>
+              <a:t> </a:t>
+            </a:r>
+            <a:r>
+              <a:rPr lang="en-US" sz="1000" dirty="0" err="1"/>
+              <a:t>actualy</a:t>
+            </a:r>
+            <a:r>
+              <a:rPr lang="en-US" sz="1000" dirty="0"/>
+              <a:t> outperforms other strategies. =&gt; each model behaves well in certain market condition. There are no </a:t>
+            </a:r>
+            <a:r>
+              <a:rPr lang="en-US" sz="1000" dirty="0" err="1"/>
+              <a:t>gurantees</a:t>
+            </a:r>
+            <a:r>
+              <a:rPr lang="en-US" sz="1000" dirty="0"/>
+              <a:t> that alternative weighting schemes outperform cap-weighted index. =&gt; diversifying across these models may help decrease error associated with picking a model.</a:t>
+            </a:r>
+          </a:p>
+          <a:p>
+            <a:pPr algn="just"/>
+            <a:endParaRPr lang="en-US" sz="1000" dirty="0"/>
+          </a:p>
+          <a:p>
+            <a:pPr algn="just"/>
+            <a:r>
+              <a:rPr lang="en-US" sz="1000" dirty="0"/>
+              <a:t>Researchers find that taking GMV and </a:t>
+            </a:r>
+            <a:r>
+              <a:rPr lang="en-US" sz="1000" dirty="0" err="1"/>
+              <a:t>msr</a:t>
+            </a:r>
+            <a:r>
+              <a:rPr lang="en-US" sz="1000" dirty="0"/>
+              <a:t> portfolios with weights 50%/50%  decreases tracking error.</a:t>
+            </a:r>
+          </a:p>
+          <a:p>
+            <a:pPr algn="just"/>
+            <a:endParaRPr lang="en-US" sz="1000" dirty="0"/>
+          </a:p>
+          <a:p>
+            <a:pPr algn="just"/>
+            <a:r>
+              <a:rPr lang="en-US" sz="1000" dirty="0"/>
+              <a:t>It can also look like that:</a:t>
+            </a:r>
+          </a:p>
+          <a:p>
+            <a:pPr algn="just"/>
+            <a:endParaRPr lang="en-US" sz="1000" dirty="0"/>
+          </a:p>
+          <a:p>
+            <a:pPr algn="just"/>
+            <a:endParaRPr lang="en-US" sz="1000" dirty="0"/>
+          </a:p>
+          <a:p>
+            <a:pPr algn="just"/>
+            <a:endParaRPr lang="en-US" sz="1000" dirty="0"/>
+          </a:p>
+          <a:p>
+            <a:pPr algn="just"/>
+            <a:endParaRPr lang="en-US" sz="1000" dirty="0"/>
+          </a:p>
+          <a:p>
+            <a:pPr algn="just"/>
+            <a:endParaRPr lang="en-US" sz="1000" dirty="0"/>
+          </a:p>
+          <a:p>
+            <a:pPr algn="just"/>
+            <a:r>
+              <a:rPr lang="en-US" sz="1000" dirty="0"/>
+              <a:t>Minimum volatility portfolio performs well in adverse market conditions, MSR provides access to bull runs. </a:t>
+            </a:r>
+          </a:p>
+        </p:txBody>
+      </p:sp>
+      <p:pic>
+        <p:nvPicPr>
+          <p:cNvPr id="14" name="Picture 13">
+            <a:extLst>
+              <a:ext uri="{FF2B5EF4-FFF2-40B4-BE49-F238E27FC236}">
+                <a16:creationId xmlns:a16="http://schemas.microsoft.com/office/drawing/2014/main" id="{3310D593-F90B-10F0-CE00-A94868A9895C}"/>
+              </a:ext>
+            </a:extLst>
+          </p:cNvPr>
+          <p:cNvPicPr>
+            <a:picLocks noChangeAspect="1"/>
+          </p:cNvPicPr>
+          <p:nvPr/>
+        </p:nvPicPr>
+        <p:blipFill>
+          <a:blip r:embed="rId2"/>
+          <a:stretch>
+            <a:fillRect/>
+          </a:stretch>
+        </p:blipFill>
+        <p:spPr>
+          <a:xfrm>
+            <a:off x="3428999" y="1947309"/>
+            <a:ext cx="2946764" cy="636501"/>
+          </a:xfrm>
+          <a:prstGeom prst="rect">
+            <a:avLst/>
+          </a:prstGeom>
+        </p:spPr>
+      </p:pic>
+    </p:spTree>
+    <p:extLst>
+      <p:ext uri="{BB962C8B-B14F-4D97-AF65-F5344CB8AC3E}">
+        <p14:creationId xmlns:p14="http://schemas.microsoft.com/office/powerpoint/2010/main" val="1372530842"/>
+      </p:ext>
+    </p:extLst>
+  </p:cSld>
+  <p:clrMapOvr>
+    <a:masterClrMapping/>
+  </p:clrMapOvr>
+</p:sld>
+</file>
+
+<file path=ppt/slides/slide7.xml><?xml version="1.0" encoding="utf-8"?>
+<p:sld xmlns:a="http://schemas.openxmlformats.org/drawingml/2006/main" xmlns:r="http://schemas.openxmlformats.org/officeDocument/2006/relationships" xmlns:p="http://schemas.openxmlformats.org/presentationml/2006/main">
+  <p:cSld>
+    <p:spTree>
+      <p:nvGrpSpPr>
+        <p:cNvPr id="1" name=""/>
+        <p:cNvGrpSpPr/>
+        <p:nvPr/>
+      </p:nvGrpSpPr>
+      <p:grpSpPr>
+        <a:xfrm>
+          <a:off x="0" y="0"/>
+          <a:ext cx="0" cy="0"/>
+          <a:chOff x="0" y="0"/>
+          <a:chExt cx="0" cy="0"/>
+        </a:xfrm>
+      </p:grpSpPr>
+      <p:sp>
+        <p:nvSpPr>
+          <p:cNvPr id="5" name="TextBox 4">
+            <a:extLst>
+              <a:ext uri="{FF2B5EF4-FFF2-40B4-BE49-F238E27FC236}">
+                <a16:creationId xmlns:a16="http://schemas.microsoft.com/office/drawing/2014/main" id="{576200C0-5D85-1E48-CEC6-F5CCBD1826A1}"/>
+              </a:ext>
+            </a:extLst>
+          </p:cNvPr>
+          <p:cNvSpPr txBox="1"/>
+          <p:nvPr/>
+        </p:nvSpPr>
+        <p:spPr>
+          <a:xfrm>
+            <a:off x="0" y="136996"/>
+            <a:ext cx="3265714" cy="9387185"/>
+          </a:xfrm>
+          <a:prstGeom prst="rect">
+            <a:avLst/>
+          </a:prstGeom>
+          <a:noFill/>
+        </p:spPr>
+        <p:txBody>
+          <a:bodyPr wrap="square">
+            <a:spAutoFit/>
+          </a:bodyPr>
+          <a:lstStyle/>
+          <a:p>
+            <a:pPr algn="just"/>
+            <a:r>
+              <a:rPr lang="en-GB" sz="1200" b="1" i="0" dirty="0">
+                <a:solidFill>
+                  <a:srgbClr val="002060"/>
+                </a:solidFill>
+                <a:effectLst/>
+              </a:rPr>
+              <a:t>Investors Need to Understand the Risks of Smart Beta</a:t>
+            </a:r>
+            <a:endParaRPr lang="en-GB" sz="1200" b="0" i="0" dirty="0">
+              <a:solidFill>
+                <a:srgbClr val="002060"/>
+              </a:solidFill>
+              <a:effectLst/>
+            </a:endParaRPr>
+          </a:p>
+          <a:p>
+            <a:pPr algn="just"/>
+            <a:endParaRPr lang="en-GB" sz="1000" dirty="0">
+              <a:solidFill>
+                <a:srgbClr val="0A0A0A"/>
+              </a:solidFill>
+            </a:endParaRPr>
+          </a:p>
+          <a:p>
+            <a:pPr algn="just"/>
+            <a:r>
+              <a:rPr lang="en-GB" sz="1000" b="0" i="0" dirty="0">
+                <a:solidFill>
+                  <a:srgbClr val="0A0A0A"/>
+                </a:solidFill>
+                <a:effectLst/>
+              </a:rPr>
+              <a:t>Smart beta investments are funds and ETFs that have a non-traditional weighting scheme that goes beyond cap weighting. There are many different types out there — equal-weighted, inversely risk-weighted, optimized to minimize risk, fundamental-weighted, factor tilts, dividend tilts, and dividend-weighted ETFs. There’s a whole taxonomy out there.</a:t>
+            </a:r>
+          </a:p>
+          <a:p>
+            <a:pPr algn="just"/>
+            <a:endParaRPr lang="en-GB" sz="1000" dirty="0">
+              <a:solidFill>
+                <a:srgbClr val="0A0A0A"/>
+              </a:solidFill>
+            </a:endParaRPr>
+          </a:p>
+          <a:p>
+            <a:pPr algn="just"/>
+            <a:r>
+              <a:rPr lang="en-GB" sz="1000" b="0" i="0" dirty="0">
+                <a:solidFill>
+                  <a:srgbClr val="0A0A0A"/>
+                </a:solidFill>
+                <a:effectLst/>
+              </a:rPr>
+              <a:t>Would I include smart beta in participant retirement plans? Possibly, but you have to select low-cost versions implementing well-known ideas that have been demonstrated to work over a long time and in different markets, like a value tilt. That’s a pretty solid factor. That’s one of the best ones out there.</a:t>
+            </a:r>
+          </a:p>
+          <a:p>
+            <a:pPr algn="just"/>
+            <a:endParaRPr lang="en-GB" sz="1000" dirty="0">
+              <a:solidFill>
+                <a:srgbClr val="0A0A0A"/>
+              </a:solidFill>
+            </a:endParaRPr>
+          </a:p>
+          <a:p>
+            <a:pPr algn="just"/>
+            <a:r>
+              <a:rPr lang="en-GB" sz="1000" b="0" i="0" dirty="0">
+                <a:solidFill>
+                  <a:srgbClr val="0A0A0A"/>
+                </a:solidFill>
+                <a:effectLst/>
+              </a:rPr>
+              <a:t>If you are a retail investor, you are typically not sophisticated, and you respond to marketing and hype. It’s our job as investment managers to be honest with these investors and really explain performance beyond the hype. They have to know the risks and the rewards of investing in these products, and there are risks. The term smart beta is a great marketing slogan, and it has caught on.</a:t>
+            </a:r>
+          </a:p>
+          <a:p>
+            <a:pPr algn="just"/>
+            <a:endParaRPr lang="en-GB" sz="1000" dirty="0">
+              <a:solidFill>
+                <a:srgbClr val="0A0A0A"/>
+              </a:solidFill>
+            </a:endParaRPr>
+          </a:p>
+          <a:p>
+            <a:pPr algn="just"/>
+            <a:r>
+              <a:rPr lang="en-GB" sz="1000" b="0" i="0" dirty="0">
+                <a:solidFill>
+                  <a:srgbClr val="0A0A0A"/>
+                </a:solidFill>
+                <a:effectLst/>
+              </a:rPr>
+              <a:t>You may have a period of massive underperformance of a particular strategy. There’s a lot of academic research that says that actively managed funds collectively underperform passive cap-weighted indices in the long run. Vanguard founder John Bogle thinks that everything that’s not an index fund is a fraud. But does it mean that the market is truly efficient and there are no anomalies? No. There are anomalies. And there are risks — mainly, that any strategy will underperform. Let’s say everybody in the world piles into value strategies. Then value will stop working.</a:t>
+            </a:r>
+          </a:p>
+          <a:p>
+            <a:pPr algn="just"/>
+            <a:endParaRPr lang="en-GB" sz="1000" dirty="0">
+              <a:solidFill>
+                <a:srgbClr val="0A0A0A"/>
+              </a:solidFill>
+            </a:endParaRPr>
+          </a:p>
+          <a:p>
+            <a:pPr algn="just"/>
+            <a:r>
+              <a:rPr lang="en-GB" sz="1000" b="0" i="0" dirty="0">
+                <a:solidFill>
+                  <a:srgbClr val="0A0A0A"/>
+                </a:solidFill>
+                <a:effectLst/>
+              </a:rPr>
+              <a:t>The market-cap-weighted index is the only index that can theoretically be held by every investor in the market. You will all get the same exposure. But in the real world, there will always be some winners and some losers.</a:t>
+            </a:r>
+          </a:p>
+          <a:p>
+            <a:pPr algn="just"/>
+            <a:endParaRPr lang="en-GB" sz="1000" dirty="0">
+              <a:solidFill>
+                <a:srgbClr val="0A0A0A"/>
+              </a:solidFill>
+            </a:endParaRPr>
+          </a:p>
+          <a:p>
+            <a:pPr algn="just"/>
+            <a:r>
+              <a:rPr lang="en-GB" sz="1000" b="0" i="0" dirty="0">
+                <a:solidFill>
+                  <a:srgbClr val="0A0A0A"/>
+                </a:solidFill>
+                <a:effectLst/>
+              </a:rPr>
+              <a:t>I’d say hybrid products that erase the boundary between active management and smart beta are where things are headed. Those are truly multi-factor, risk-aware investment strategies.</a:t>
+            </a:r>
+          </a:p>
+          <a:p>
+            <a:pPr algn="just"/>
+            <a:endParaRPr lang="en-GB" sz="1000" dirty="0">
+              <a:solidFill>
+                <a:srgbClr val="0A0A0A"/>
+              </a:solidFill>
+            </a:endParaRPr>
+          </a:p>
+          <a:p>
+            <a:pPr algn="just"/>
+            <a:r>
+              <a:rPr lang="en-GB" sz="1000" b="0" i="0" dirty="0">
+                <a:solidFill>
+                  <a:srgbClr val="0A0A0A"/>
+                </a:solidFill>
+                <a:effectLst/>
+              </a:rPr>
+              <a:t>We live in a low-yield environment with investors who are desperate to outperform the traditional indices and asset classes, so I think marketing has a huge role to play in whether or not these hybrid products catch on.</a:t>
+            </a:r>
+          </a:p>
+          <a:p>
+            <a:pPr algn="just"/>
+            <a:endParaRPr lang="en-GB" sz="1000" dirty="0">
+              <a:solidFill>
+                <a:srgbClr val="0A0A0A"/>
+              </a:solidFill>
+            </a:endParaRPr>
+          </a:p>
+          <a:p>
+            <a:pPr algn="just"/>
+            <a:r>
+              <a:rPr lang="en-GB" sz="1000" b="0" i="0" dirty="0">
+                <a:solidFill>
+                  <a:srgbClr val="0A0A0A"/>
+                </a:solidFill>
+                <a:effectLst/>
+              </a:rPr>
+              <a:t>Beware of risks. Beware of costs. Invest in more robust ideas, like value. Momentum isn’t robust. On that basis, my heart lies with lower-cost solutions that offer you a cheap value tilt.</a:t>
+            </a:r>
+          </a:p>
+          <a:p>
+            <a:pPr algn="just"/>
+            <a:endParaRPr lang="en-GB" sz="1000" dirty="0">
+              <a:solidFill>
+                <a:srgbClr val="0A0A0A"/>
+              </a:solidFill>
+            </a:endParaRPr>
+          </a:p>
+          <a:p>
+            <a:pPr algn="just"/>
+            <a:r>
+              <a:rPr lang="en-GB" sz="1000" dirty="0">
+                <a:solidFill>
+                  <a:srgbClr val="0A0A0A"/>
+                </a:solidFill>
+              </a:rPr>
+              <a:t>Source: </a:t>
+            </a:r>
+            <a:r>
+              <a:rPr lang="en-GB" sz="1000" dirty="0">
+                <a:solidFill>
+                  <a:srgbClr val="0A0A0A"/>
+                </a:solidFill>
+                <a:hlinkClick r:id="rId2"/>
+              </a:rPr>
+              <a:t>Nick Baturin</a:t>
+            </a:r>
+            <a:endParaRPr lang="ru-RU" sz="1000" dirty="0">
+              <a:solidFill>
+                <a:srgbClr val="0A0A0A"/>
+              </a:solidFill>
+            </a:endParaRPr>
+          </a:p>
+          <a:p>
+            <a:pPr algn="just"/>
+            <a:r>
+              <a:rPr lang="en-GB" sz="1000" dirty="0">
+                <a:hlinkClick r:id="rId3"/>
+              </a:rPr>
+              <a:t>https://www.linkedin.com/in/nickbaturin/</a:t>
+            </a:r>
+            <a:endParaRPr lang="ru-RU" sz="1000" dirty="0"/>
+          </a:p>
+          <a:p>
+            <a:pPr algn="just"/>
+            <a:endParaRPr lang="en-FR" sz="1000" dirty="0"/>
+          </a:p>
+        </p:txBody>
+      </p:sp>
+    </p:spTree>
+    <p:extLst>
+      <p:ext uri="{BB962C8B-B14F-4D97-AF65-F5344CB8AC3E}">
+        <p14:creationId xmlns:p14="http://schemas.microsoft.com/office/powerpoint/2010/main" val="1010815970"/>
+      </p:ext>
+    </p:extLst>
+  </p:cSld>
+  <p:clrMapOvr>
+    <a:masterClrMapping/>
+  </p:clrMapOvr>
+</p:sld>
+</file>
+
+<file path=ppt/slides/slide8.xml><?xml version="1.0" encoding="utf-8"?>
 <p:sld xmlns:a="http://schemas.openxmlformats.org/drawingml/2006/main" xmlns:r="http://schemas.openxmlformats.org/officeDocument/2006/relationships" xmlns:p="http://schemas.openxmlformats.org/presentationml/2006/main">
   <p:cSld>
     <p:spTree>
@@ -10496,8 +13311,8 @@
           </a:p>
         </p:txBody>
       </p:sp>
-      <mc:AlternateContent xmlns:mc="http://schemas.openxmlformats.org/markup-compatibility/2006">
-        <mc:Choice xmlns:a14="http://schemas.microsoft.com/office/drawing/2010/main" Requires="a14">
+      <mc:AlternateContent xmlns:mc="http://schemas.openxmlformats.org/markup-compatibility/2006" xmlns:a14="http://schemas.microsoft.com/office/drawing/2010/main">
+        <mc:Choice Requires="a14">
           <p:sp>
             <p:nvSpPr>
               <p:cNvPr id="12" name="TextBox 11">
@@ -10526,6 +13341,7 @@
               </a:bodyPr>
               <a:lstStyle/>
               <a:p>
+                <a:pPr/>
                 <a14:m>
                   <m:oMathPara xmlns:m="http://schemas.openxmlformats.org/officeDocument/2006/math">
                     <m:oMathParaPr>
@@ -10546,7 +13362,7 @@
             </p:txBody>
           </p:sp>
         </mc:Choice>
-        <mc:Fallback>
+        <mc:Fallback xmlns="">
           <p:sp>
             <p:nvSpPr>
               <p:cNvPr id="12" name="TextBox 11">
@@ -10695,8 +13511,8 @@
           </a:p>
         </p:txBody>
       </p:sp>
-      <mc:AlternateContent xmlns:mc="http://schemas.openxmlformats.org/markup-compatibility/2006">
-        <mc:Choice xmlns:a14="http://schemas.microsoft.com/office/drawing/2010/main" Requires="a14">
+      <mc:AlternateContent xmlns:mc="http://schemas.openxmlformats.org/markup-compatibility/2006" xmlns:a14="http://schemas.microsoft.com/office/drawing/2010/main">
+        <mc:Choice Requires="a14">
           <p:sp>
             <p:nvSpPr>
               <p:cNvPr id="15" name="TextBox 14">
@@ -10725,6 +13541,7 @@
               </a:bodyPr>
               <a:lstStyle/>
               <a:p>
+                <a:pPr/>
                 <a14:m>
                   <m:oMathPara xmlns:m="http://schemas.openxmlformats.org/officeDocument/2006/math">
                     <m:oMathParaPr>
@@ -10838,7 +13655,7 @@
             </p:txBody>
           </p:sp>
         </mc:Choice>
-        <mc:Fallback>
+        <mc:Fallback xmlns="">
           <p:sp>
             <p:nvSpPr>
               <p:cNvPr id="15" name="TextBox 14">
@@ -11033,7 +13850,7 @@
         <p:spPr>
           <a:xfrm>
             <a:off x="43569" y="2040257"/>
-            <a:ext cx="3446873" cy="1015663"/>
+            <a:ext cx="4053948" cy="4555093"/>
           </a:xfrm>
           <a:prstGeom prst="rect">
             <a:avLst/>
@@ -11086,7 +13903,260 @@
               </a:rPr>
               <a:t>4) What to do with Heston volatility, it does not behave well</a:t>
             </a:r>
-            <a:endParaRPr lang="en-GB" sz="1000" dirty="0"/>
+          </a:p>
+          <a:p>
+            <a:pPr algn="just"/>
+            <a:r>
+              <a:rPr lang="en-GB" sz="1000" dirty="0">
+                <a:latin typeface="Dcr10"/>
+              </a:rPr>
+              <a:t>5) You said that cap weighted is bad. But </a:t>
+            </a:r>
+            <a:r>
+              <a:rPr lang="en-GB" sz="1000" dirty="0" err="1">
+                <a:latin typeface="Dcr10"/>
+              </a:rPr>
+              <a:t>ramans</a:t>
+            </a:r>
+            <a:r>
+              <a:rPr lang="en-GB" sz="1000" dirty="0">
+                <a:latin typeface="Dcr10"/>
+              </a:rPr>
+              <a:t> paper of 2022 with SDFs shows that 95% of systematic risk variance is explained by cap weighted portfolio. While systematic risk accounts for 30% of total risk. Is it really that bad?</a:t>
+            </a:r>
+          </a:p>
+          <a:p>
+            <a:pPr algn="just"/>
+            <a:r>
+              <a:rPr lang="en-GB" sz="1000" dirty="0">
+                <a:latin typeface="Dcr10"/>
+              </a:rPr>
+              <a:t>6) Can you give info about the full case? I need to see the full picture</a:t>
+            </a:r>
+          </a:p>
+          <a:p>
+            <a:pPr algn="just"/>
+            <a:r>
+              <a:rPr lang="en-GB" sz="1000" dirty="0">
+                <a:latin typeface="Dcr10"/>
+              </a:rPr>
+              <a:t>7) Why relativistic astrophysics and quantum mechanics?</a:t>
+            </a:r>
+          </a:p>
+          <a:p>
+            <a:pPr algn="just"/>
+            <a:r>
+              <a:rPr lang="en-GB" sz="1000" dirty="0">
+                <a:latin typeface="Dcr10"/>
+              </a:rPr>
+              <a:t>How do I actually choose factors?</a:t>
+            </a:r>
+          </a:p>
+          <a:p>
+            <a:pPr algn="just"/>
+            <a:r>
+              <a:rPr lang="en-GB" sz="1000" dirty="0">
+                <a:latin typeface="Dcr10"/>
+              </a:rPr>
+              <a:t>Unsystematic is 60% explained by other factors through</a:t>
+            </a:r>
+          </a:p>
+          <a:p>
+            <a:pPr algn="just"/>
+            <a:r>
+              <a:rPr lang="en-GB" sz="1000" dirty="0">
+                <a:latin typeface="Dcr10"/>
+              </a:rPr>
+              <a:t>8) What asset managers to pick in France?</a:t>
+            </a:r>
+          </a:p>
+          <a:p>
+            <a:pPr algn="just"/>
+            <a:r>
+              <a:rPr lang="en-GB" sz="1000" dirty="0">
+                <a:highlight>
+                  <a:srgbClr val="FFFF00"/>
+                </a:highlight>
+                <a:latin typeface="Dcr10"/>
+              </a:rPr>
+              <a:t>9) What is difference of usual factor policy and </a:t>
+            </a:r>
+            <a:r>
+              <a:rPr lang="en-GB" sz="1000" dirty="0" err="1">
+                <a:highlight>
+                  <a:srgbClr val="FFFF00"/>
+                </a:highlight>
+                <a:latin typeface="Dcr10"/>
+              </a:rPr>
+              <a:t>ppp</a:t>
+            </a:r>
+            <a:r>
+              <a:rPr lang="en-GB" sz="1000" dirty="0">
+                <a:highlight>
+                  <a:srgbClr val="FFFF00"/>
+                </a:highlight>
+                <a:latin typeface="Dcr10"/>
+              </a:rPr>
+              <a:t>? Need to have a look at </a:t>
+            </a:r>
+            <a:r>
+              <a:rPr lang="en-GB" sz="1000" dirty="0" err="1">
+                <a:highlight>
+                  <a:srgbClr val="FFFF00"/>
+                </a:highlight>
+                <a:latin typeface="Dcr10"/>
+              </a:rPr>
+              <a:t>raman’s</a:t>
+            </a:r>
+            <a:r>
+              <a:rPr lang="en-GB" sz="1000" dirty="0">
+                <a:highlight>
+                  <a:srgbClr val="FFFF00"/>
+                </a:highlight>
+                <a:latin typeface="Dcr10"/>
+              </a:rPr>
+              <a:t> class and get some python notebook on that.</a:t>
+            </a:r>
+          </a:p>
+          <a:p>
+            <a:pPr algn="just"/>
+            <a:r>
+              <a:rPr lang="en-GB" sz="1000" dirty="0">
+                <a:highlight>
+                  <a:srgbClr val="FFFF00"/>
+                </a:highlight>
+                <a:latin typeface="Dcr10"/>
+              </a:rPr>
+              <a:t>In our simulations what should be correlation of SR and stock volatility</a:t>
+            </a:r>
+          </a:p>
+          <a:p>
+            <a:pPr algn="just"/>
+            <a:endParaRPr lang="en-GB" sz="1000" dirty="0">
+              <a:highlight>
+                <a:srgbClr val="FFFF00"/>
+              </a:highlight>
+              <a:latin typeface="Dcr10"/>
+            </a:endParaRPr>
+          </a:p>
+          <a:p>
+            <a:pPr algn="just"/>
+            <a:endParaRPr lang="en-GB" sz="1000" dirty="0">
+              <a:highlight>
+                <a:srgbClr val="FFFF00"/>
+              </a:highlight>
+              <a:latin typeface="Dcr10"/>
+            </a:endParaRPr>
+          </a:p>
+          <a:p>
+            <a:pPr algn="just"/>
+            <a:endParaRPr lang="en-GB" sz="1000" dirty="0">
+              <a:highlight>
+                <a:srgbClr val="FFFF00"/>
+              </a:highlight>
+              <a:latin typeface="Dcr10"/>
+            </a:endParaRPr>
+          </a:p>
+          <a:p>
+            <a:pPr algn="just"/>
+            <a:endParaRPr lang="en-GB" sz="1000" dirty="0">
+              <a:highlight>
+                <a:srgbClr val="FFFF00"/>
+              </a:highlight>
+              <a:latin typeface="Dcr10"/>
+            </a:endParaRPr>
+          </a:p>
+          <a:p>
+            <a:pPr algn="just"/>
+            <a:endParaRPr lang="en-GB" sz="1000" dirty="0">
+              <a:highlight>
+                <a:srgbClr val="FFFF00"/>
+              </a:highlight>
+              <a:latin typeface="Dcr10"/>
+            </a:endParaRPr>
+          </a:p>
+          <a:p>
+            <a:pPr algn="just"/>
+            <a:endParaRPr lang="en-GB" sz="1000" dirty="0">
+              <a:highlight>
+                <a:srgbClr val="FFFF00"/>
+              </a:highlight>
+              <a:latin typeface="Dcr10"/>
+            </a:endParaRPr>
+          </a:p>
+          <a:p>
+            <a:pPr algn="just"/>
+            <a:endParaRPr lang="en-GB" sz="1000" dirty="0">
+              <a:highlight>
+                <a:srgbClr val="FFFF00"/>
+              </a:highlight>
+              <a:latin typeface="Dcr10"/>
+            </a:endParaRPr>
+          </a:p>
+          <a:p>
+            <a:pPr algn="just"/>
+            <a:endParaRPr lang="en-GB" sz="1000" dirty="0">
+              <a:highlight>
+                <a:srgbClr val="FFFF00"/>
+              </a:highlight>
+              <a:latin typeface="Dcr10"/>
+            </a:endParaRPr>
+          </a:p>
+          <a:p>
+            <a:pPr algn="just"/>
+            <a:r>
+              <a:rPr lang="en-GB" sz="1000" dirty="0">
+                <a:highlight>
+                  <a:srgbClr val="FFFF00"/>
+                </a:highlight>
+                <a:latin typeface="Dcr10"/>
+              </a:rPr>
+              <a:t>What is lambda r? (asked chat GPT and got the answer)</a:t>
+            </a:r>
+          </a:p>
+          <a:p>
+            <a:pPr algn="just"/>
+            <a:endParaRPr lang="en-GB" sz="1000" dirty="0">
+              <a:highlight>
+                <a:srgbClr val="FFFF00"/>
+              </a:highlight>
+              <a:latin typeface="Dcr10"/>
+            </a:endParaRPr>
+          </a:p>
+          <a:p>
+            <a:pPr algn="just"/>
+            <a:r>
+              <a:rPr lang="en-GB" sz="1000" dirty="0">
+                <a:highlight>
+                  <a:srgbClr val="FFFF00"/>
+                </a:highlight>
+                <a:latin typeface="Dcr10"/>
+              </a:rPr>
+              <a:t>+ check the correlation matrix with </a:t>
+            </a:r>
+            <a:r>
+              <a:rPr lang="en-GB" sz="1000" dirty="0" err="1">
+                <a:highlight>
+                  <a:srgbClr val="FFFF00"/>
+                </a:highlight>
+                <a:latin typeface="Dcr10"/>
+              </a:rPr>
+              <a:t>lionel</a:t>
+            </a:r>
+            <a:r>
+              <a:rPr lang="en-GB" sz="1000" dirty="0">
+                <a:highlight>
+                  <a:srgbClr val="FFFF00"/>
+                </a:highlight>
+                <a:latin typeface="Dcr10"/>
+              </a:rPr>
+              <a:t>!!!</a:t>
+            </a:r>
+            <a:endParaRPr lang="en-GB" sz="1000" dirty="0">
+              <a:highlight>
+                <a:srgbClr val="FFFF00"/>
+              </a:highlight>
+            </a:endParaRPr>
           </a:p>
         </p:txBody>
       </p:sp>
@@ -11104,8 +14174,8 @@
         </p:nvSpPr>
         <p:spPr>
           <a:xfrm>
-            <a:off x="1" y="3181119"/>
-            <a:ext cx="3428998" cy="3293209"/>
+            <a:off x="1" y="6653961"/>
+            <a:ext cx="3428998" cy="3600986"/>
           </a:xfrm>
           <a:prstGeom prst="rect">
             <a:avLst/>
@@ -11222,12 +14292,217 @@
               <a:t> or you, it will lead to good discussions.</a:t>
             </a:r>
           </a:p>
-        </p:txBody>
-      </p:sp>
+          <a:p>
+            <a:pPr algn="just"/>
+            <a:endParaRPr lang="en-GB" sz="1000" dirty="0"/>
+          </a:p>
+          <a:p>
+            <a:pPr algn="just"/>
+            <a:r>
+              <a:rPr lang="en-GB" sz="1000" dirty="0"/>
+              <a:t>Note for self: </a:t>
+            </a:r>
+            <a:r>
+              <a:rPr lang="ru-RU" sz="1000" dirty="0"/>
+              <a:t>говоря о </a:t>
+            </a:r>
+            <a:r>
+              <a:rPr lang="en-US" sz="1000" dirty="0"/>
+              <a:t>PSP</a:t>
+            </a:r>
+            <a:r>
+              <a:rPr lang="ru-RU" sz="1000" dirty="0"/>
+              <a:t> как о мече, можно фехтовать</a:t>
+            </a:r>
+            <a:endParaRPr lang="en-GB" sz="1000" dirty="0"/>
+          </a:p>
+        </p:txBody>
+      </p:sp>
+      <p:pic>
+        <p:nvPicPr>
+          <p:cNvPr id="3" name="Picture 2">
+            <a:extLst>
+              <a:ext uri="{FF2B5EF4-FFF2-40B4-BE49-F238E27FC236}">
+                <a16:creationId xmlns:a16="http://schemas.microsoft.com/office/drawing/2014/main" id="{CA200424-B7C3-4621-E95D-62FB180407B3}"/>
+              </a:ext>
+            </a:extLst>
+          </p:cNvPr>
+          <p:cNvPicPr>
+            <a:picLocks noChangeAspect="1"/>
+          </p:cNvPicPr>
+          <p:nvPr/>
+        </p:nvPicPr>
+        <p:blipFill>
+          <a:blip r:embed="rId4"/>
+          <a:stretch>
+            <a:fillRect/>
+          </a:stretch>
+        </p:blipFill>
+        <p:spPr>
+          <a:xfrm>
+            <a:off x="130977" y="4803003"/>
+            <a:ext cx="2327088" cy="1109842"/>
+          </a:xfrm>
+          <a:prstGeom prst="rect">
+            <a:avLst/>
+          </a:prstGeom>
+        </p:spPr>
+      </p:pic>
     </p:spTree>
     <p:extLst>
       <p:ext uri="{BB962C8B-B14F-4D97-AF65-F5344CB8AC3E}">
         <p14:creationId xmlns:p14="http://schemas.microsoft.com/office/powerpoint/2010/main" val="276937941"/>
+      </p:ext>
+    </p:extLst>
+  </p:cSld>
+  <p:clrMapOvr>
+    <a:masterClrMapping/>
+  </p:clrMapOvr>
+</p:sld>
+</file>
+
+<file path=ppt/slides/slide9.xml><?xml version="1.0" encoding="utf-8"?>
+<p:sld xmlns:a="http://schemas.openxmlformats.org/drawingml/2006/main" xmlns:r="http://schemas.openxmlformats.org/officeDocument/2006/relationships" xmlns:p="http://schemas.openxmlformats.org/presentationml/2006/main">
+  <p:cSld>
+    <p:spTree>
+      <p:nvGrpSpPr>
+        <p:cNvPr id="1" name="">
+          <a:extLst>
+            <a:ext uri="{FF2B5EF4-FFF2-40B4-BE49-F238E27FC236}">
+              <a16:creationId xmlns:a16="http://schemas.microsoft.com/office/drawing/2014/main" id="{CD5BB872-6AB4-0EEF-E719-AD3F449B0752}"/>
+            </a:ext>
+          </a:extLst>
+        </p:cNvPr>
+        <p:cNvGrpSpPr/>
+        <p:nvPr/>
+      </p:nvGrpSpPr>
+      <p:grpSpPr>
+        <a:xfrm>
+          <a:off x="0" y="0"/>
+          <a:ext cx="0" cy="0"/>
+          <a:chOff x="0" y="0"/>
+          <a:chExt cx="0" cy="0"/>
+        </a:xfrm>
+      </p:grpSpPr>
+      <p:sp>
+        <p:nvSpPr>
+          <p:cNvPr id="4" name="TextBox 3">
+            <a:extLst>
+              <a:ext uri="{FF2B5EF4-FFF2-40B4-BE49-F238E27FC236}">
+                <a16:creationId xmlns:a16="http://schemas.microsoft.com/office/drawing/2014/main" id="{C5DF34CE-5BDB-A88E-26AD-DB905FB826DA}"/>
+              </a:ext>
+            </a:extLst>
+          </p:cNvPr>
+          <p:cNvSpPr txBox="1"/>
+          <p:nvPr/>
+        </p:nvSpPr>
+        <p:spPr>
+          <a:xfrm>
+            <a:off x="0" y="82031"/>
+            <a:ext cx="3446873" cy="1908215"/>
+          </a:xfrm>
+          <a:prstGeom prst="rect">
+            <a:avLst/>
+          </a:prstGeom>
+          <a:noFill/>
+        </p:spPr>
+        <p:txBody>
+          <a:bodyPr wrap="square" rtlCol="0">
+            <a:spAutoFit/>
+          </a:bodyPr>
+          <a:lstStyle/>
+          <a:p>
+            <a:pPr algn="just"/>
+            <a:r>
+              <a:rPr lang="en-US" sz="1400" b="1" dirty="0">
+                <a:solidFill>
+                  <a:srgbClr val="002060"/>
+                </a:solidFill>
+              </a:rPr>
+              <a:t>CASE</a:t>
+            </a:r>
+          </a:p>
+          <a:p>
+            <a:pPr algn="just"/>
+            <a:endParaRPr lang="en-US" sz="1400" b="1" dirty="0">
+              <a:solidFill>
+                <a:srgbClr val="002060"/>
+              </a:solidFill>
+            </a:endParaRPr>
+          </a:p>
+          <a:p>
+            <a:pPr algn="just"/>
+            <a:r>
+              <a:rPr lang="en-GB" sz="1000" dirty="0">
+                <a:latin typeface="Dcr10"/>
+              </a:rPr>
+              <a:t>1) We pick some factors we like and some stocks we like and weight them</a:t>
+            </a:r>
+          </a:p>
+          <a:p>
+            <a:pPr algn="just"/>
+            <a:r>
+              <a:rPr lang="en-GB" sz="1000" dirty="0">
+                <a:latin typeface="Dcr10"/>
+              </a:rPr>
+              <a:t>Mixture of 5 </a:t>
+            </a:r>
+            <a:r>
+              <a:rPr lang="en-GB" sz="1000" dirty="0" err="1">
+                <a:latin typeface="Dcr10"/>
+              </a:rPr>
+              <a:t>weighteing</a:t>
+            </a:r>
+            <a:r>
+              <a:rPr lang="en-GB" sz="1000" dirty="0">
+                <a:latin typeface="Dcr10"/>
+              </a:rPr>
+              <a:t> schemes is a bit smarter than each of them on their own.</a:t>
+            </a:r>
+          </a:p>
+          <a:p>
+            <a:pPr algn="just"/>
+            <a:endParaRPr lang="en-GB" sz="1000" dirty="0">
+              <a:latin typeface="Dcr10"/>
+            </a:endParaRPr>
+          </a:p>
+          <a:p>
+            <a:pPr algn="just"/>
+            <a:endParaRPr lang="en-GB" sz="1000" dirty="0">
+              <a:latin typeface="Dcr10"/>
+            </a:endParaRPr>
+          </a:p>
+          <a:p>
+            <a:pPr algn="just"/>
+            <a:r>
+              <a:rPr lang="en-GB" sz="1000" dirty="0">
+                <a:latin typeface="Dcr10"/>
+              </a:rPr>
+              <a:t>You construct smart factor</a:t>
+            </a:r>
+          </a:p>
+          <a:p>
+            <a:pPr algn="just"/>
+            <a:endParaRPr lang="en-GB" sz="1000" dirty="0">
+              <a:latin typeface="Dcr10"/>
+            </a:endParaRPr>
+          </a:p>
+          <a:p>
+            <a:pPr algn="just"/>
+            <a:r>
+              <a:rPr lang="en-GB" sz="1000" dirty="0">
+                <a:latin typeface="Dcr10"/>
+              </a:rPr>
+              <a:t>Then you allocate. To allocate you use same principles</a:t>
+            </a:r>
+            <a:endParaRPr lang="en-GB" sz="1000" dirty="0"/>
+          </a:p>
+        </p:txBody>
+      </p:sp>
+    </p:spTree>
+    <p:extLst>
+      <p:ext uri="{BB962C8B-B14F-4D97-AF65-F5344CB8AC3E}">
+        <p14:creationId xmlns:p14="http://schemas.microsoft.com/office/powerpoint/2010/main" val="2309599917"/>
       </p:ext>
     </p:extLst>
   </p:cSld>

</xml_diff>